<commit_message>
Finish the slides for module 4 and 5
</commit_message>
<xml_diff>
--- a/Slides/MVA-What'sNewC#6-Module4.pptx
+++ b/Slides/MVA-What'sNewC#6-Module4.pptx
@@ -6,10 +6,10 @@
     <p:sldMasterId id="2147483861" r:id="rId5"/>
   </p:sldMasterIdLst>
   <p:notesMasterIdLst>
-    <p:notesMasterId r:id="rId15"/>
+    <p:notesMasterId r:id="rId20"/>
   </p:notesMasterIdLst>
   <p:handoutMasterIdLst>
-    <p:handoutMasterId r:id="rId16"/>
+    <p:handoutMasterId r:id="rId21"/>
   </p:handoutMasterIdLst>
   <p:sldIdLst>
     <p:sldId id="287" r:id="rId6"/>
@@ -17,10 +17,15 @@
     <p:sldId id="271" r:id="rId8"/>
     <p:sldId id="288" r:id="rId9"/>
     <p:sldId id="289" r:id="rId10"/>
-    <p:sldId id="272" r:id="rId11"/>
-    <p:sldId id="285" r:id="rId12"/>
-    <p:sldId id="267" r:id="rId13"/>
-    <p:sldId id="286" r:id="rId14"/>
+    <p:sldId id="290" r:id="rId11"/>
+    <p:sldId id="272" r:id="rId12"/>
+    <p:sldId id="285" r:id="rId13"/>
+    <p:sldId id="292" r:id="rId14"/>
+    <p:sldId id="267" r:id="rId15"/>
+    <p:sldId id="293" r:id="rId16"/>
+    <p:sldId id="294" r:id="rId17"/>
+    <p:sldId id="291" r:id="rId18"/>
+    <p:sldId id="286" r:id="rId19"/>
   </p:sldIdLst>
   <p:sldSz cx="12188825" cy="6858000"/>
   <p:notesSz cx="6858000" cy="9144000"/>
@@ -351,7 +356,7 @@
                 <a:latin typeface="Segoe UI" pitchFamily="34" charset="0"/>
               </a:rPr>
               <a:pPr/>
-              <a:t>3/3/2015</a:t>
+              <a:t>3/4/2015</a:t>
             </a:fld>
             <a:endParaRPr lang="en-US" dirty="0">
               <a:latin typeface="Segoe UI" pitchFamily="34" charset="0"/>
@@ -572,7 +577,7 @@
             <a:fld id="{7C3FBCD4-166E-446F-AF18-7D4A0CF9AEF6}" type="datetimeFigureOut">
               <a:rPr lang="en-US" smtClean="0"/>
               <a:pPr/>
-              <a:t>3/3/2015</a:t>
+              <a:t>3/4/2015</a:t>
             </a:fld>
             <a:endParaRPr lang="en-US" dirty="0"/>
           </a:p>
@@ -1011,6 +1016,261 @@
 </p:notes>
 </file>
 
+<file path=ppt/notesSlides/notesSlide10.xml><?xml version="1.0" encoding="utf-8"?>
+<p:notes xmlns:a="http://schemas.openxmlformats.org/drawingml/2006/main" xmlns:r="http://schemas.openxmlformats.org/officeDocument/2006/relationships" xmlns:p="http://schemas.openxmlformats.org/presentationml/2006/main">
+  <p:cSld>
+    <p:spTree>
+      <p:nvGrpSpPr>
+        <p:cNvPr id="1" name=""/>
+        <p:cNvGrpSpPr/>
+        <p:nvPr/>
+      </p:nvGrpSpPr>
+      <p:grpSpPr>
+        <a:xfrm>
+          <a:off x="0" y="0"/>
+          <a:ext cx="0" cy="0"/>
+          <a:chOff x="0" y="0"/>
+          <a:chExt cx="0" cy="0"/>
+        </a:xfrm>
+      </p:grpSpPr>
+      <p:sp>
+        <p:nvSpPr>
+          <p:cNvPr id="2" name="Slide Image Placeholder 1"/>
+          <p:cNvSpPr>
+            <a:spLocks noGrp="1" noRot="1" noChangeAspect="1"/>
+          </p:cNvSpPr>
+          <p:nvPr>
+            <p:ph type="sldImg"/>
+          </p:nvPr>
+        </p:nvSpPr>
+        <p:spPr/>
+      </p:sp>
+      <p:sp>
+        <p:nvSpPr>
+          <p:cNvPr id="3" name="Notes Placeholder 2"/>
+          <p:cNvSpPr>
+            <a:spLocks noGrp="1"/>
+          </p:cNvSpPr>
+          <p:nvPr>
+            <p:ph type="body" idx="1"/>
+          </p:nvPr>
+        </p:nvSpPr>
+        <p:spPr/>
+        <p:txBody>
+          <a:bodyPr/>
+          <a:lstStyle/>
+          <a:p>
+            <a:endParaRPr lang="en-US" dirty="0"/>
+          </a:p>
+        </p:txBody>
+      </p:sp>
+      <p:sp>
+        <p:nvSpPr>
+          <p:cNvPr id="4" name="Slide Number Placeholder 3"/>
+          <p:cNvSpPr>
+            <a:spLocks noGrp="1"/>
+          </p:cNvSpPr>
+          <p:nvPr>
+            <p:ph type="sldNum" sz="quarter" idx="10"/>
+          </p:nvPr>
+        </p:nvSpPr>
+        <p:spPr/>
+        <p:txBody>
+          <a:bodyPr/>
+          <a:lstStyle/>
+          <a:p>
+            <a:fld id="{8B263312-38AA-4E1E-B2B5-0F8F122B24FE}" type="slidenum">
+              <a:rPr lang="en-US" smtClean="0"/>
+              <a:pPr/>
+              <a:t>12</a:t>
+            </a:fld>
+            <a:endParaRPr lang="en-US" dirty="0"/>
+          </a:p>
+        </p:txBody>
+      </p:sp>
+    </p:spTree>
+    <p:extLst>
+      <p:ext uri="{BB962C8B-B14F-4D97-AF65-F5344CB8AC3E}">
+        <p14:creationId xmlns:p14="http://schemas.microsoft.com/office/powerpoint/2010/main" val="4028618416"/>
+      </p:ext>
+    </p:extLst>
+  </p:cSld>
+  <p:clrMapOvr>
+    <a:masterClrMapping/>
+  </p:clrMapOvr>
+</p:notes>
+</file>
+
+<file path=ppt/notesSlides/notesSlide11.xml><?xml version="1.0" encoding="utf-8"?>
+<p:notes xmlns:a="http://schemas.openxmlformats.org/drawingml/2006/main" xmlns:r="http://schemas.openxmlformats.org/officeDocument/2006/relationships" xmlns:p="http://schemas.openxmlformats.org/presentationml/2006/main">
+  <p:cSld>
+    <p:spTree>
+      <p:nvGrpSpPr>
+        <p:cNvPr id="1" name=""/>
+        <p:cNvGrpSpPr/>
+        <p:nvPr/>
+      </p:nvGrpSpPr>
+      <p:grpSpPr>
+        <a:xfrm>
+          <a:off x="0" y="0"/>
+          <a:ext cx="0" cy="0"/>
+          <a:chOff x="0" y="0"/>
+          <a:chExt cx="0" cy="0"/>
+        </a:xfrm>
+      </p:grpSpPr>
+      <p:sp>
+        <p:nvSpPr>
+          <p:cNvPr id="2" name="Slide Image Placeholder 1"/>
+          <p:cNvSpPr>
+            <a:spLocks noGrp="1" noRot="1" noChangeAspect="1"/>
+          </p:cNvSpPr>
+          <p:nvPr>
+            <p:ph type="sldImg"/>
+          </p:nvPr>
+        </p:nvSpPr>
+        <p:spPr/>
+      </p:sp>
+      <p:sp>
+        <p:nvSpPr>
+          <p:cNvPr id="3" name="Notes Placeholder 2"/>
+          <p:cNvSpPr>
+            <a:spLocks noGrp="1"/>
+          </p:cNvSpPr>
+          <p:nvPr>
+            <p:ph type="body" idx="1"/>
+          </p:nvPr>
+        </p:nvSpPr>
+        <p:spPr/>
+        <p:txBody>
+          <a:bodyPr/>
+          <a:lstStyle/>
+          <a:p>
+            <a:endParaRPr lang="en-US" dirty="0"/>
+          </a:p>
+        </p:txBody>
+      </p:sp>
+      <p:sp>
+        <p:nvSpPr>
+          <p:cNvPr id="4" name="Slide Number Placeholder 3"/>
+          <p:cNvSpPr>
+            <a:spLocks noGrp="1"/>
+          </p:cNvSpPr>
+          <p:nvPr>
+            <p:ph type="sldNum" sz="quarter" idx="10"/>
+          </p:nvPr>
+        </p:nvSpPr>
+        <p:spPr/>
+        <p:txBody>
+          <a:bodyPr/>
+          <a:lstStyle/>
+          <a:p>
+            <a:fld id="{8B263312-38AA-4E1E-B2B5-0F8F122B24FE}" type="slidenum">
+              <a:rPr lang="en-US" smtClean="0"/>
+              <a:pPr/>
+              <a:t>13</a:t>
+            </a:fld>
+            <a:endParaRPr lang="en-US" dirty="0"/>
+          </a:p>
+        </p:txBody>
+      </p:sp>
+    </p:spTree>
+    <p:extLst>
+      <p:ext uri="{BB962C8B-B14F-4D97-AF65-F5344CB8AC3E}">
+        <p14:creationId xmlns:p14="http://schemas.microsoft.com/office/powerpoint/2010/main" val="2919077905"/>
+      </p:ext>
+    </p:extLst>
+  </p:cSld>
+  <p:clrMapOvr>
+    <a:masterClrMapping/>
+  </p:clrMapOvr>
+</p:notes>
+</file>
+
+<file path=ppt/notesSlides/notesSlide12.xml><?xml version="1.0" encoding="utf-8"?>
+<p:notes xmlns:a="http://schemas.openxmlformats.org/drawingml/2006/main" xmlns:r="http://schemas.openxmlformats.org/officeDocument/2006/relationships" xmlns:p="http://schemas.openxmlformats.org/presentationml/2006/main">
+  <p:cSld>
+    <p:spTree>
+      <p:nvGrpSpPr>
+        <p:cNvPr id="1" name=""/>
+        <p:cNvGrpSpPr/>
+        <p:nvPr/>
+      </p:nvGrpSpPr>
+      <p:grpSpPr>
+        <a:xfrm>
+          <a:off x="0" y="0"/>
+          <a:ext cx="0" cy="0"/>
+          <a:chOff x="0" y="0"/>
+          <a:chExt cx="0" cy="0"/>
+        </a:xfrm>
+      </p:grpSpPr>
+      <p:sp>
+        <p:nvSpPr>
+          <p:cNvPr id="2" name="Slide Image Placeholder 1"/>
+          <p:cNvSpPr>
+            <a:spLocks noGrp="1" noRot="1" noChangeAspect="1"/>
+          </p:cNvSpPr>
+          <p:nvPr>
+            <p:ph type="sldImg"/>
+          </p:nvPr>
+        </p:nvSpPr>
+        <p:spPr/>
+      </p:sp>
+      <p:sp>
+        <p:nvSpPr>
+          <p:cNvPr id="3" name="Notes Placeholder 2"/>
+          <p:cNvSpPr>
+            <a:spLocks noGrp="1"/>
+          </p:cNvSpPr>
+          <p:nvPr>
+            <p:ph type="body" idx="1"/>
+          </p:nvPr>
+        </p:nvSpPr>
+        <p:spPr/>
+        <p:txBody>
+          <a:bodyPr/>
+          <a:lstStyle/>
+          <a:p>
+            <a:endParaRPr lang="en-US" dirty="0"/>
+          </a:p>
+        </p:txBody>
+      </p:sp>
+      <p:sp>
+        <p:nvSpPr>
+          <p:cNvPr id="4" name="Slide Number Placeholder 3"/>
+          <p:cNvSpPr>
+            <a:spLocks noGrp="1"/>
+          </p:cNvSpPr>
+          <p:nvPr>
+            <p:ph type="sldNum" sz="quarter" idx="10"/>
+          </p:nvPr>
+        </p:nvSpPr>
+        <p:spPr/>
+        <p:txBody>
+          <a:bodyPr/>
+          <a:lstStyle/>
+          <a:p>
+            <a:fld id="{8B263312-38AA-4E1E-B2B5-0F8F122B24FE}" type="slidenum">
+              <a:rPr lang="en-US" smtClean="0"/>
+              <a:pPr/>
+              <a:t>14</a:t>
+            </a:fld>
+            <a:endParaRPr lang="en-US" dirty="0"/>
+          </a:p>
+        </p:txBody>
+      </p:sp>
+    </p:spTree>
+    <p:extLst>
+      <p:ext uri="{BB962C8B-B14F-4D97-AF65-F5344CB8AC3E}">
+        <p14:creationId xmlns:p14="http://schemas.microsoft.com/office/powerpoint/2010/main" val="1816462127"/>
+      </p:ext>
+    </p:extLst>
+  </p:cSld>
+  <p:clrMapOvr>
+    <a:masterClrMapping/>
+  </p:clrMapOvr>
+</p:notes>
+</file>
+
 <file path=ppt/notesSlides/notesSlide2.xml><?xml version="1.0" encoding="utf-8"?>
 <p:notes xmlns:a="http://schemas.openxmlformats.org/drawingml/2006/main" xmlns:r="http://schemas.openxmlformats.org/officeDocument/2006/relationships" xmlns:p="http://schemas.openxmlformats.org/presentationml/2006/main">
   <p:cSld>
@@ -1394,7 +1654,7 @@
     </p:spTree>
     <p:extLst>
       <p:ext uri="{BB962C8B-B14F-4D97-AF65-F5344CB8AC3E}">
-        <p14:creationId xmlns:p14="http://schemas.microsoft.com/office/powerpoint/2010/main" val="3989130091"/>
+        <p14:creationId xmlns:p14="http://schemas.microsoft.com/office/powerpoint/2010/main" val="702324244"/>
       </p:ext>
     </p:extLst>
   </p:cSld>
@@ -1479,7 +1739,7 @@
     </p:spTree>
     <p:extLst>
       <p:ext uri="{BB962C8B-B14F-4D97-AF65-F5344CB8AC3E}">
-        <p14:creationId xmlns:p14="http://schemas.microsoft.com/office/powerpoint/2010/main" val="2683605714"/>
+        <p14:creationId xmlns:p14="http://schemas.microsoft.com/office/powerpoint/2010/main" val="3989130091"/>
       </p:ext>
     </p:extLst>
   </p:cSld>
@@ -1556,6 +1816,91 @@
               <a:rPr lang="en-US" smtClean="0"/>
               <a:pPr/>
               <a:t>8</a:t>
+            </a:fld>
+            <a:endParaRPr lang="en-US" dirty="0"/>
+          </a:p>
+        </p:txBody>
+      </p:sp>
+    </p:spTree>
+    <p:extLst>
+      <p:ext uri="{BB962C8B-B14F-4D97-AF65-F5344CB8AC3E}">
+        <p14:creationId xmlns:p14="http://schemas.microsoft.com/office/powerpoint/2010/main" val="2683605714"/>
+      </p:ext>
+    </p:extLst>
+  </p:cSld>
+  <p:clrMapOvr>
+    <a:masterClrMapping/>
+  </p:clrMapOvr>
+</p:notes>
+</file>
+
+<file path=ppt/notesSlides/notesSlide9.xml><?xml version="1.0" encoding="utf-8"?>
+<p:notes xmlns:a="http://schemas.openxmlformats.org/drawingml/2006/main" xmlns:r="http://schemas.openxmlformats.org/officeDocument/2006/relationships" xmlns:p="http://schemas.openxmlformats.org/presentationml/2006/main">
+  <p:cSld>
+    <p:spTree>
+      <p:nvGrpSpPr>
+        <p:cNvPr id="1" name=""/>
+        <p:cNvGrpSpPr/>
+        <p:nvPr/>
+      </p:nvGrpSpPr>
+      <p:grpSpPr>
+        <a:xfrm>
+          <a:off x="0" y="0"/>
+          <a:ext cx="0" cy="0"/>
+          <a:chOff x="0" y="0"/>
+          <a:chExt cx="0" cy="0"/>
+        </a:xfrm>
+      </p:grpSpPr>
+      <p:sp>
+        <p:nvSpPr>
+          <p:cNvPr id="2" name="Slide Image Placeholder 1"/>
+          <p:cNvSpPr>
+            <a:spLocks noGrp="1" noRot="1" noChangeAspect="1"/>
+          </p:cNvSpPr>
+          <p:nvPr>
+            <p:ph type="sldImg"/>
+          </p:nvPr>
+        </p:nvSpPr>
+        <p:spPr/>
+      </p:sp>
+      <p:sp>
+        <p:nvSpPr>
+          <p:cNvPr id="3" name="Notes Placeholder 2"/>
+          <p:cNvSpPr>
+            <a:spLocks noGrp="1"/>
+          </p:cNvSpPr>
+          <p:nvPr>
+            <p:ph type="body" idx="1"/>
+          </p:nvPr>
+        </p:nvSpPr>
+        <p:spPr/>
+        <p:txBody>
+          <a:bodyPr/>
+          <a:lstStyle/>
+          <a:p>
+            <a:endParaRPr lang="en-US" dirty="0"/>
+          </a:p>
+        </p:txBody>
+      </p:sp>
+      <p:sp>
+        <p:nvSpPr>
+          <p:cNvPr id="4" name="Slide Number Placeholder 3"/>
+          <p:cNvSpPr>
+            <a:spLocks noGrp="1"/>
+          </p:cNvSpPr>
+          <p:nvPr>
+            <p:ph type="sldNum" sz="quarter" idx="10"/>
+          </p:nvPr>
+        </p:nvSpPr>
+        <p:spPr/>
+        <p:txBody>
+          <a:bodyPr/>
+          <a:lstStyle/>
+          <a:p>
+            <a:fld id="{8B263312-38AA-4E1E-B2B5-0F8F122B24FE}" type="slidenum">
+              <a:rPr lang="en-US" smtClean="0"/>
+              <a:pPr/>
+              <a:t>10</a:t>
             </a:fld>
             <a:endParaRPr lang="en-US" dirty="0"/>
           </a:p>
@@ -8148,6 +8493,1965 @@
 </p:sld>
 </file>
 
+<file path=ppt/slides/slide10.xml><?xml version="1.0" encoding="utf-8"?>
+<p:sld xmlns:a="http://schemas.openxmlformats.org/drawingml/2006/main" xmlns:r="http://schemas.openxmlformats.org/officeDocument/2006/relationships" xmlns:p="http://schemas.openxmlformats.org/presentationml/2006/main">
+  <p:cSld>
+    <p:spTree>
+      <p:nvGrpSpPr>
+        <p:cNvPr id="1" name=""/>
+        <p:cNvGrpSpPr/>
+        <p:nvPr/>
+      </p:nvGrpSpPr>
+      <p:grpSpPr>
+        <a:xfrm>
+          <a:off x="0" y="0"/>
+          <a:ext cx="0" cy="0"/>
+          <a:chOff x="0" y="0"/>
+          <a:chExt cx="0" cy="0"/>
+        </a:xfrm>
+      </p:grpSpPr>
+      <p:sp>
+        <p:nvSpPr>
+          <p:cNvPr id="4" name="Subtitle 3"/>
+          <p:cNvSpPr>
+            <a:spLocks noGrp="1"/>
+          </p:cNvSpPr>
+          <p:nvPr>
+            <p:ph type="subTitle" idx="1"/>
+          </p:nvPr>
+        </p:nvSpPr>
+        <p:spPr/>
+        <p:txBody>
+          <a:bodyPr/>
+          <a:lstStyle/>
+          <a:p>
+            <a:r>
+              <a:rPr lang="en-US" b="0" dirty="0"/>
+              <a:t>https://</a:t>
+            </a:r>
+            <a:r>
+              <a:rPr lang="en-US" b="0" dirty="0" smtClean="0"/>
+              <a:t>github.com/BillWagner/MVA-CSharp6</a:t>
+            </a:r>
+          </a:p>
+          <a:p>
+            <a:r>
+              <a:rPr lang="en-US" dirty="0" smtClean="0"/>
+              <a:t>Exception Filters</a:t>
+            </a:r>
+            <a:endParaRPr lang="en-US" dirty="0"/>
+          </a:p>
+        </p:txBody>
+      </p:sp>
+      <p:sp>
+        <p:nvSpPr>
+          <p:cNvPr id="2" name="Text Placeholder 1"/>
+          <p:cNvSpPr>
+            <a:spLocks noGrp="1"/>
+          </p:cNvSpPr>
+          <p:nvPr>
+            <p:ph type="body" sz="quarter" idx="10"/>
+          </p:nvPr>
+        </p:nvSpPr>
+        <p:spPr/>
+        <p:txBody>
+          <a:bodyPr/>
+          <a:lstStyle/>
+          <a:p>
+            <a:r>
+              <a:rPr lang="en-US" smtClean="0"/>
+              <a:t>demo</a:t>
+            </a:r>
+            <a:endParaRPr lang="en-US" dirty="0"/>
+          </a:p>
+        </p:txBody>
+      </p:sp>
+    </p:spTree>
+    <p:extLst>
+      <p:ext uri="{BB962C8B-B14F-4D97-AF65-F5344CB8AC3E}">
+        <p14:creationId xmlns:p14="http://schemas.microsoft.com/office/powerpoint/2010/main" val="3993867577"/>
+      </p:ext>
+    </p:extLst>
+  </p:cSld>
+  <p:clrMapOvr>
+    <a:masterClrMapping/>
+  </p:clrMapOvr>
+  <p:transition>
+    <p:fade/>
+  </p:transition>
+  <p:timing>
+    <p:tnLst>
+      <p:par>
+        <p:cTn id="1" dur="indefinite" restart="never" nodeType="tmRoot"/>
+      </p:par>
+    </p:tnLst>
+  </p:timing>
+</p:sld>
+</file>
+
+<file path=ppt/slides/slide11.xml><?xml version="1.0" encoding="utf-8"?>
+<p:sld xmlns:a="http://schemas.openxmlformats.org/drawingml/2006/main" xmlns:r="http://schemas.openxmlformats.org/officeDocument/2006/relationships" xmlns:p="http://schemas.openxmlformats.org/presentationml/2006/main">
+  <p:cSld>
+    <p:spTree>
+      <p:nvGrpSpPr>
+        <p:cNvPr id="1" name=""/>
+        <p:cNvGrpSpPr/>
+        <p:nvPr/>
+      </p:nvGrpSpPr>
+      <p:grpSpPr>
+        <a:xfrm>
+          <a:off x="0" y="0"/>
+          <a:ext cx="0" cy="0"/>
+          <a:chOff x="0" y="0"/>
+          <a:chExt cx="0" cy="0"/>
+        </a:xfrm>
+      </p:grpSpPr>
+      <p:sp>
+        <p:nvSpPr>
+          <p:cNvPr id="2" name="Text Placeholder 1"/>
+          <p:cNvSpPr>
+            <a:spLocks noGrp="1"/>
+          </p:cNvSpPr>
+          <p:nvPr>
+            <p:ph type="body" sz="quarter" idx="10"/>
+          </p:nvPr>
+        </p:nvSpPr>
+        <p:spPr/>
+        <p:txBody>
+          <a:bodyPr/>
+          <a:lstStyle/>
+          <a:p>
+            <a:r>
+              <a:rPr lang="en-US" sz="3600" dirty="0" smtClean="0">
+                <a:ln w="0"/>
+                <a:effectLst>
+                  <a:outerShdw blurRad="38100" dist="19050" dir="2700000" algn="tl" rotWithShape="0">
+                    <a:schemeClr val="dk1">
+                      <a:alpha val="40000"/>
+                    </a:schemeClr>
+                  </a:outerShdw>
+                </a:effectLst>
+              </a:rPr>
+              <a:t>Await in catch and finally</a:t>
+            </a:r>
+            <a:endParaRPr lang="en-US" sz="3600" dirty="0">
+              <a:ln w="0"/>
+              <a:effectLst>
+                <a:outerShdw blurRad="38100" dist="19050" dir="2700000" algn="tl" rotWithShape="0">
+                  <a:schemeClr val="dk1">
+                    <a:alpha val="40000"/>
+                  </a:schemeClr>
+                </a:outerShdw>
+              </a:effectLst>
+            </a:endParaRPr>
+          </a:p>
+          <a:p>
+            <a:endParaRPr lang="en-US" dirty="0"/>
+          </a:p>
+        </p:txBody>
+      </p:sp>
+      <p:sp>
+        <p:nvSpPr>
+          <p:cNvPr id="3" name="Subtitle 2"/>
+          <p:cNvSpPr>
+            <a:spLocks noGrp="1"/>
+          </p:cNvSpPr>
+          <p:nvPr>
+            <p:ph type="subTitle" idx="1"/>
+          </p:nvPr>
+        </p:nvSpPr>
+        <p:spPr/>
+        <p:txBody>
+          <a:bodyPr/>
+          <a:lstStyle/>
+          <a:p>
+            <a:endParaRPr lang="en-US"/>
+          </a:p>
+        </p:txBody>
+      </p:sp>
+    </p:spTree>
+    <p:extLst>
+      <p:ext uri="{BB962C8B-B14F-4D97-AF65-F5344CB8AC3E}">
+        <p14:creationId xmlns:p14="http://schemas.microsoft.com/office/powerpoint/2010/main" val="2551072299"/>
+      </p:ext>
+    </p:extLst>
+  </p:cSld>
+  <p:clrMapOvr>
+    <a:masterClrMapping/>
+  </p:clrMapOvr>
+</p:sld>
+</file>
+
+<file path=ppt/slides/slide12.xml><?xml version="1.0" encoding="utf-8"?>
+<p:sld xmlns:a="http://schemas.openxmlformats.org/drawingml/2006/main" xmlns:r="http://schemas.openxmlformats.org/officeDocument/2006/relationships" xmlns:p="http://schemas.openxmlformats.org/presentationml/2006/main">
+  <p:cSld>
+    <p:spTree>
+      <p:nvGrpSpPr>
+        <p:cNvPr id="1" name=""/>
+        <p:cNvGrpSpPr/>
+        <p:nvPr/>
+      </p:nvGrpSpPr>
+      <p:grpSpPr>
+        <a:xfrm>
+          <a:off x="0" y="0"/>
+          <a:ext cx="0" cy="0"/>
+          <a:chOff x="0" y="0"/>
+          <a:chExt cx="0" cy="0"/>
+        </a:xfrm>
+      </p:grpSpPr>
+      <p:sp>
+        <p:nvSpPr>
+          <p:cNvPr id="4" name="Subtitle 3"/>
+          <p:cNvSpPr>
+            <a:spLocks noGrp="1"/>
+          </p:cNvSpPr>
+          <p:nvPr>
+            <p:ph type="subTitle" idx="1"/>
+          </p:nvPr>
+        </p:nvSpPr>
+        <p:spPr/>
+        <p:txBody>
+          <a:bodyPr/>
+          <a:lstStyle/>
+          <a:p>
+            <a:r>
+              <a:rPr lang="en-US" b="0" dirty="0"/>
+              <a:t>https://</a:t>
+            </a:r>
+            <a:r>
+              <a:rPr lang="en-US" b="0" dirty="0" smtClean="0"/>
+              <a:t>github.com/BillWagner/MVA-CSharp6</a:t>
+            </a:r>
+          </a:p>
+          <a:p>
+            <a:r>
+              <a:rPr lang="en-US" dirty="0" smtClean="0"/>
+              <a:t>Await in Catch and Finally</a:t>
+            </a:r>
+            <a:endParaRPr lang="en-US" dirty="0"/>
+          </a:p>
+        </p:txBody>
+      </p:sp>
+      <p:sp>
+        <p:nvSpPr>
+          <p:cNvPr id="2" name="Text Placeholder 1"/>
+          <p:cNvSpPr>
+            <a:spLocks noGrp="1"/>
+          </p:cNvSpPr>
+          <p:nvPr>
+            <p:ph type="body" sz="quarter" idx="10"/>
+          </p:nvPr>
+        </p:nvSpPr>
+        <p:spPr/>
+        <p:txBody>
+          <a:bodyPr/>
+          <a:lstStyle/>
+          <a:p>
+            <a:r>
+              <a:rPr lang="en-US" smtClean="0"/>
+              <a:t>demo</a:t>
+            </a:r>
+            <a:endParaRPr lang="en-US" dirty="0"/>
+          </a:p>
+        </p:txBody>
+      </p:sp>
+    </p:spTree>
+    <p:extLst>
+      <p:ext uri="{BB962C8B-B14F-4D97-AF65-F5344CB8AC3E}">
+        <p14:creationId xmlns:p14="http://schemas.microsoft.com/office/powerpoint/2010/main" val="538450443"/>
+      </p:ext>
+    </p:extLst>
+  </p:cSld>
+  <p:clrMapOvr>
+    <a:masterClrMapping/>
+  </p:clrMapOvr>
+  <p:transition>
+    <p:fade/>
+  </p:transition>
+  <p:timing>
+    <p:tnLst>
+      <p:par>
+        <p:cTn id="1" dur="indefinite" restart="never" nodeType="tmRoot"/>
+      </p:par>
+    </p:tnLst>
+  </p:timing>
+</p:sld>
+</file>
+
+<file path=ppt/slides/slide13.xml><?xml version="1.0" encoding="utf-8"?>
+<p:sld xmlns:a="http://schemas.openxmlformats.org/drawingml/2006/main" xmlns:r="http://schemas.openxmlformats.org/officeDocument/2006/relationships" xmlns:p="http://schemas.openxmlformats.org/presentationml/2006/main">
+  <p:cSld>
+    <p:spTree>
+      <p:nvGrpSpPr>
+        <p:cNvPr id="1" name=""/>
+        <p:cNvGrpSpPr/>
+        <p:nvPr/>
+      </p:nvGrpSpPr>
+      <p:grpSpPr>
+        <a:xfrm>
+          <a:off x="0" y="0"/>
+          <a:ext cx="0" cy="0"/>
+          <a:chOff x="0" y="0"/>
+          <a:chExt cx="0" cy="0"/>
+        </a:xfrm>
+      </p:grpSpPr>
+      <p:sp>
+        <p:nvSpPr>
+          <p:cNvPr id="5" name="Title 4"/>
+          <p:cNvSpPr>
+            <a:spLocks noGrp="1"/>
+          </p:cNvSpPr>
+          <p:nvPr>
+            <p:ph type="title"/>
+          </p:nvPr>
+        </p:nvSpPr>
+        <p:spPr/>
+        <p:txBody>
+          <a:bodyPr/>
+          <a:lstStyle/>
+          <a:p>
+            <a:r>
+              <a:rPr lang="en-US" dirty="0" smtClean="0"/>
+              <a:t>Exception Filters and enhanced await</a:t>
+            </a:r>
+            <a:endParaRPr lang="en-US" dirty="0"/>
+          </a:p>
+        </p:txBody>
+      </p:sp>
+      <p:sp>
+        <p:nvSpPr>
+          <p:cNvPr id="7" name="Content Placeholder 2"/>
+          <p:cNvSpPr>
+            <a:spLocks noGrp="1"/>
+          </p:cNvSpPr>
+          <p:nvPr>
+            <p:ph idx="4294967295"/>
+          </p:nvPr>
+        </p:nvSpPr>
+        <p:spPr>
+          <a:xfrm>
+            <a:off x="0" y="760614"/>
+            <a:ext cx="7133244" cy="3708739"/>
+          </a:xfrm>
+          <a:prstGeom prst="rect">
+            <a:avLst/>
+          </a:prstGeom>
+        </p:spPr>
+        <p:txBody>
+          <a:bodyPr>
+            <a:normAutofit/>
+          </a:bodyPr>
+          <a:lstStyle/>
+          <a:p>
+            <a:pPr marL="0" marR="0" indent="0">
+              <a:lnSpc>
+                <a:spcPct val="107000"/>
+              </a:lnSpc>
+              <a:spcBef>
+                <a:spcPts val="0"/>
+              </a:spcBef>
+              <a:spcAft>
+                <a:spcPts val="0"/>
+              </a:spcAft>
+              <a:buNone/>
+            </a:pPr>
+            <a:r>
+              <a:rPr lang="en-US" sz="1800" dirty="0" err="1">
+                <a:solidFill>
+                  <a:srgbClr val="0000FF"/>
+                </a:solidFill>
+                <a:latin typeface="Consolas" panose="020B0609020204030204" pitchFamily="49" charset="0"/>
+                <a:ea typeface="Calibri" panose="020F0502020204030204" pitchFamily="34" charset="0"/>
+                <a:cs typeface="Consolas" panose="020B0609020204030204" pitchFamily="49" charset="0"/>
+              </a:rPr>
+              <a:t>int</a:t>
+            </a:r>
+            <a:r>
+              <a:rPr lang="en-US" sz="1800" dirty="0">
+                <a:solidFill>
+                  <a:srgbClr val="000000"/>
+                </a:solidFill>
+                <a:latin typeface="Consolas" panose="020B0609020204030204" pitchFamily="49" charset="0"/>
+                <a:ea typeface="Calibri" panose="020F0502020204030204" pitchFamily="34" charset="0"/>
+                <a:cs typeface="Consolas" panose="020B0609020204030204" pitchFamily="49" charset="0"/>
+              </a:rPr>
+              <a:t> failures = 0;</a:t>
+            </a:r>
+            <a:endParaRPr lang="en-US" sz="1800" dirty="0">
+              <a:latin typeface="Consolas" panose="020B0609020204030204" pitchFamily="49" charset="0"/>
+              <a:ea typeface="Calibri" panose="020F0502020204030204" pitchFamily="34" charset="0"/>
+              <a:cs typeface="Consolas" panose="020B0609020204030204" pitchFamily="49" charset="0"/>
+            </a:endParaRPr>
+          </a:p>
+          <a:p>
+            <a:pPr marL="0" marR="0" indent="0">
+              <a:lnSpc>
+                <a:spcPct val="107000"/>
+              </a:lnSpc>
+              <a:spcBef>
+                <a:spcPts val="0"/>
+              </a:spcBef>
+              <a:spcAft>
+                <a:spcPts val="0"/>
+              </a:spcAft>
+              <a:buNone/>
+            </a:pPr>
+            <a:r>
+              <a:rPr lang="en-US" sz="1800" dirty="0">
+                <a:solidFill>
+                  <a:srgbClr val="0000FF"/>
+                </a:solidFill>
+                <a:latin typeface="Consolas" panose="020B0609020204030204" pitchFamily="49" charset="0"/>
+                <a:ea typeface="Calibri" panose="020F0502020204030204" pitchFamily="34" charset="0"/>
+                <a:cs typeface="Consolas" panose="020B0609020204030204" pitchFamily="49" charset="0"/>
+              </a:rPr>
+              <a:t>for</a:t>
+            </a:r>
+            <a:r>
+              <a:rPr lang="en-US" sz="1800" dirty="0">
+                <a:solidFill>
+                  <a:srgbClr val="000000"/>
+                </a:solidFill>
+                <a:latin typeface="Consolas" panose="020B0609020204030204" pitchFamily="49" charset="0"/>
+                <a:ea typeface="Calibri" panose="020F0502020204030204" pitchFamily="34" charset="0"/>
+                <a:cs typeface="Consolas" panose="020B0609020204030204" pitchFamily="49" charset="0"/>
+              </a:rPr>
+              <a:t> (</a:t>
+            </a:r>
+            <a:r>
+              <a:rPr lang="en-US" sz="1800" dirty="0" err="1">
+                <a:solidFill>
+                  <a:srgbClr val="0000FF"/>
+                </a:solidFill>
+                <a:latin typeface="Consolas" panose="020B0609020204030204" pitchFamily="49" charset="0"/>
+                <a:ea typeface="Calibri" panose="020F0502020204030204" pitchFamily="34" charset="0"/>
+                <a:cs typeface="Consolas" panose="020B0609020204030204" pitchFamily="49" charset="0"/>
+              </a:rPr>
+              <a:t>int</a:t>
+            </a:r>
+            <a:r>
+              <a:rPr lang="en-US" sz="1800" dirty="0">
+                <a:solidFill>
+                  <a:srgbClr val="000000"/>
+                </a:solidFill>
+                <a:latin typeface="Consolas" panose="020B0609020204030204" pitchFamily="49" charset="0"/>
+                <a:ea typeface="Calibri" panose="020F0502020204030204" pitchFamily="34" charset="0"/>
+                <a:cs typeface="Consolas" panose="020B0609020204030204" pitchFamily="49" charset="0"/>
+              </a:rPr>
+              <a:t> </a:t>
+            </a:r>
+            <a:r>
+              <a:rPr lang="en-US" sz="1800" dirty="0" err="1">
+                <a:solidFill>
+                  <a:srgbClr val="000000"/>
+                </a:solidFill>
+                <a:latin typeface="Consolas" panose="020B0609020204030204" pitchFamily="49" charset="0"/>
+                <a:ea typeface="Calibri" panose="020F0502020204030204" pitchFamily="34" charset="0"/>
+                <a:cs typeface="Consolas" panose="020B0609020204030204" pitchFamily="49" charset="0"/>
+              </a:rPr>
+              <a:t>i</a:t>
+            </a:r>
+            <a:r>
+              <a:rPr lang="en-US" sz="1800" dirty="0">
+                <a:solidFill>
+                  <a:srgbClr val="000000"/>
+                </a:solidFill>
+                <a:latin typeface="Consolas" panose="020B0609020204030204" pitchFamily="49" charset="0"/>
+                <a:ea typeface="Calibri" panose="020F0502020204030204" pitchFamily="34" charset="0"/>
+                <a:cs typeface="Consolas" panose="020B0609020204030204" pitchFamily="49" charset="0"/>
+              </a:rPr>
+              <a:t> = 0; </a:t>
+            </a:r>
+            <a:r>
+              <a:rPr lang="en-US" sz="1800" dirty="0" err="1">
+                <a:solidFill>
+                  <a:srgbClr val="000000"/>
+                </a:solidFill>
+                <a:latin typeface="Consolas" panose="020B0609020204030204" pitchFamily="49" charset="0"/>
+                <a:ea typeface="Calibri" panose="020F0502020204030204" pitchFamily="34" charset="0"/>
+                <a:cs typeface="Consolas" panose="020B0609020204030204" pitchFamily="49" charset="0"/>
+              </a:rPr>
+              <a:t>i</a:t>
+            </a:r>
+            <a:r>
+              <a:rPr lang="en-US" sz="1800" dirty="0">
+                <a:solidFill>
+                  <a:srgbClr val="000000"/>
+                </a:solidFill>
+                <a:latin typeface="Consolas" panose="020B0609020204030204" pitchFamily="49" charset="0"/>
+                <a:ea typeface="Calibri" panose="020F0502020204030204" pitchFamily="34" charset="0"/>
+                <a:cs typeface="Consolas" panose="020B0609020204030204" pitchFamily="49" charset="0"/>
+              </a:rPr>
+              <a:t> &lt; 100; </a:t>
+            </a:r>
+            <a:r>
+              <a:rPr lang="en-US" sz="1800" dirty="0" err="1">
+                <a:solidFill>
+                  <a:srgbClr val="000000"/>
+                </a:solidFill>
+                <a:latin typeface="Consolas" panose="020B0609020204030204" pitchFamily="49" charset="0"/>
+                <a:ea typeface="Calibri" panose="020F0502020204030204" pitchFamily="34" charset="0"/>
+                <a:cs typeface="Consolas" panose="020B0609020204030204" pitchFamily="49" charset="0"/>
+              </a:rPr>
+              <a:t>i</a:t>
+            </a:r>
+            <a:r>
+              <a:rPr lang="en-US" sz="1800" dirty="0">
+                <a:solidFill>
+                  <a:srgbClr val="000000"/>
+                </a:solidFill>
+                <a:latin typeface="Consolas" panose="020B0609020204030204" pitchFamily="49" charset="0"/>
+                <a:ea typeface="Calibri" panose="020F0502020204030204" pitchFamily="34" charset="0"/>
+                <a:cs typeface="Consolas" panose="020B0609020204030204" pitchFamily="49" charset="0"/>
+              </a:rPr>
+              <a:t>++)</a:t>
+            </a:r>
+            <a:endParaRPr lang="en-US" sz="1800" dirty="0">
+              <a:latin typeface="Consolas" panose="020B0609020204030204" pitchFamily="49" charset="0"/>
+              <a:ea typeface="Calibri" panose="020F0502020204030204" pitchFamily="34" charset="0"/>
+              <a:cs typeface="Consolas" panose="020B0609020204030204" pitchFamily="49" charset="0"/>
+            </a:endParaRPr>
+          </a:p>
+          <a:p>
+            <a:pPr marL="0" marR="0" indent="0">
+              <a:lnSpc>
+                <a:spcPct val="107000"/>
+              </a:lnSpc>
+              <a:spcBef>
+                <a:spcPts val="0"/>
+              </a:spcBef>
+              <a:spcAft>
+                <a:spcPts val="0"/>
+              </a:spcAft>
+              <a:buNone/>
+            </a:pPr>
+            <a:r>
+              <a:rPr lang="en-US" sz="1800" dirty="0">
+                <a:solidFill>
+                  <a:srgbClr val="000000"/>
+                </a:solidFill>
+                <a:latin typeface="Consolas" panose="020B0609020204030204" pitchFamily="49" charset="0"/>
+                <a:ea typeface="Calibri" panose="020F0502020204030204" pitchFamily="34" charset="0"/>
+                <a:cs typeface="Consolas" panose="020B0609020204030204" pitchFamily="49" charset="0"/>
+              </a:rPr>
+              <a:t>{</a:t>
+            </a:r>
+            <a:endParaRPr lang="en-US" sz="1800" dirty="0">
+              <a:latin typeface="Consolas" panose="020B0609020204030204" pitchFamily="49" charset="0"/>
+              <a:ea typeface="Calibri" panose="020F0502020204030204" pitchFamily="34" charset="0"/>
+              <a:cs typeface="Consolas" panose="020B0609020204030204" pitchFamily="49" charset="0"/>
+            </a:endParaRPr>
+          </a:p>
+          <a:p>
+            <a:pPr marL="0" marR="0" indent="0">
+              <a:lnSpc>
+                <a:spcPct val="107000"/>
+              </a:lnSpc>
+              <a:spcBef>
+                <a:spcPts val="0"/>
+              </a:spcBef>
+              <a:spcAft>
+                <a:spcPts val="0"/>
+              </a:spcAft>
+              <a:buNone/>
+            </a:pPr>
+            <a:r>
+              <a:rPr lang="en-US" sz="1800" dirty="0">
+                <a:solidFill>
+                  <a:srgbClr val="000000"/>
+                </a:solidFill>
+                <a:latin typeface="Consolas" panose="020B0609020204030204" pitchFamily="49" charset="0"/>
+                <a:ea typeface="Calibri" panose="020F0502020204030204" pitchFamily="34" charset="0"/>
+                <a:cs typeface="Consolas" panose="020B0609020204030204" pitchFamily="49" charset="0"/>
+              </a:rPr>
+              <a:t>    </a:t>
+            </a:r>
+            <a:r>
+              <a:rPr lang="en-US" sz="1800" dirty="0">
+                <a:solidFill>
+                  <a:srgbClr val="0000FF"/>
+                </a:solidFill>
+                <a:latin typeface="Consolas" panose="020B0609020204030204" pitchFamily="49" charset="0"/>
+                <a:ea typeface="Calibri" panose="020F0502020204030204" pitchFamily="34" charset="0"/>
+                <a:cs typeface="Consolas" panose="020B0609020204030204" pitchFamily="49" charset="0"/>
+              </a:rPr>
+              <a:t>try</a:t>
+            </a:r>
+            <a:r>
+              <a:rPr lang="en-US" sz="1800" dirty="0">
+                <a:solidFill>
+                  <a:srgbClr val="000000"/>
+                </a:solidFill>
+                <a:latin typeface="Consolas" panose="020B0609020204030204" pitchFamily="49" charset="0"/>
+                <a:ea typeface="Calibri" panose="020F0502020204030204" pitchFamily="34" charset="0"/>
+                <a:cs typeface="Consolas" panose="020B0609020204030204" pitchFamily="49" charset="0"/>
+              </a:rPr>
+              <a:t> {</a:t>
+            </a:r>
+            <a:endParaRPr lang="en-US" sz="1800" dirty="0">
+              <a:latin typeface="Consolas" panose="020B0609020204030204" pitchFamily="49" charset="0"/>
+              <a:ea typeface="Calibri" panose="020F0502020204030204" pitchFamily="34" charset="0"/>
+              <a:cs typeface="Consolas" panose="020B0609020204030204" pitchFamily="49" charset="0"/>
+            </a:endParaRPr>
+          </a:p>
+          <a:p>
+            <a:pPr marL="0" marR="0" indent="0">
+              <a:lnSpc>
+                <a:spcPct val="107000"/>
+              </a:lnSpc>
+              <a:spcBef>
+                <a:spcPts val="0"/>
+              </a:spcBef>
+              <a:spcAft>
+                <a:spcPts val="0"/>
+              </a:spcAft>
+              <a:buNone/>
+            </a:pPr>
+            <a:r>
+              <a:rPr lang="en-US" sz="1800" dirty="0">
+                <a:solidFill>
+                  <a:srgbClr val="000000"/>
+                </a:solidFill>
+                <a:latin typeface="Consolas" panose="020B0609020204030204" pitchFamily="49" charset="0"/>
+                <a:ea typeface="Calibri" panose="020F0502020204030204" pitchFamily="34" charset="0"/>
+                <a:cs typeface="Consolas" panose="020B0609020204030204" pitchFamily="49" charset="0"/>
+              </a:rPr>
+              <a:t>        </a:t>
+            </a:r>
+            <a:r>
+              <a:rPr lang="en-US" sz="1800" dirty="0" err="1">
+                <a:solidFill>
+                  <a:srgbClr val="0000FF"/>
+                </a:solidFill>
+                <a:latin typeface="Consolas" panose="020B0609020204030204" pitchFamily="49" charset="0"/>
+                <a:ea typeface="Calibri" panose="020F0502020204030204" pitchFamily="34" charset="0"/>
+                <a:cs typeface="Consolas" panose="020B0609020204030204" pitchFamily="49" charset="0"/>
+              </a:rPr>
+              <a:t>var</a:t>
+            </a:r>
+            <a:r>
+              <a:rPr lang="en-US" sz="1800" dirty="0">
+                <a:solidFill>
+                  <a:srgbClr val="000000"/>
+                </a:solidFill>
+                <a:latin typeface="Consolas" panose="020B0609020204030204" pitchFamily="49" charset="0"/>
+                <a:ea typeface="Calibri" panose="020F0502020204030204" pitchFamily="34" charset="0"/>
+                <a:cs typeface="Consolas" panose="020B0609020204030204" pitchFamily="49" charset="0"/>
+              </a:rPr>
+              <a:t> points = </a:t>
+            </a:r>
+            <a:r>
+              <a:rPr lang="en-US" sz="1800" dirty="0" err="1">
+                <a:solidFill>
+                  <a:srgbClr val="000000"/>
+                </a:solidFill>
+                <a:latin typeface="Consolas" panose="020B0609020204030204" pitchFamily="49" charset="0"/>
+                <a:ea typeface="Calibri" panose="020F0502020204030204" pitchFamily="34" charset="0"/>
+                <a:cs typeface="Consolas" panose="020B0609020204030204" pitchFamily="49" charset="0"/>
+              </a:rPr>
+              <a:t>SimulatedWebRequest</a:t>
+            </a:r>
+            <a:r>
+              <a:rPr lang="en-US" sz="1800" dirty="0">
+                <a:solidFill>
+                  <a:srgbClr val="000000"/>
+                </a:solidFill>
+                <a:latin typeface="Consolas" panose="020B0609020204030204" pitchFamily="49" charset="0"/>
+                <a:ea typeface="Calibri" panose="020F0502020204030204" pitchFamily="34" charset="0"/>
+                <a:cs typeface="Consolas" panose="020B0609020204030204" pitchFamily="49" charset="0"/>
+              </a:rPr>
+              <a:t>();</a:t>
+            </a:r>
+            <a:endParaRPr lang="en-US" sz="1800" dirty="0">
+              <a:latin typeface="Consolas" panose="020B0609020204030204" pitchFamily="49" charset="0"/>
+              <a:ea typeface="Calibri" panose="020F0502020204030204" pitchFamily="34" charset="0"/>
+              <a:cs typeface="Consolas" panose="020B0609020204030204" pitchFamily="49" charset="0"/>
+            </a:endParaRPr>
+          </a:p>
+          <a:p>
+            <a:pPr marL="0" marR="0" indent="0">
+              <a:lnSpc>
+                <a:spcPct val="107000"/>
+              </a:lnSpc>
+              <a:spcBef>
+                <a:spcPts val="0"/>
+              </a:spcBef>
+              <a:spcAft>
+                <a:spcPts val="0"/>
+              </a:spcAft>
+              <a:buNone/>
+            </a:pPr>
+            <a:r>
+              <a:rPr lang="en-US" sz="1800" dirty="0">
+                <a:solidFill>
+                  <a:srgbClr val="000000"/>
+                </a:solidFill>
+                <a:latin typeface="Consolas" panose="020B0609020204030204" pitchFamily="49" charset="0"/>
+                <a:ea typeface="Calibri" panose="020F0502020204030204" pitchFamily="34" charset="0"/>
+                <a:cs typeface="Consolas" panose="020B0609020204030204" pitchFamily="49" charset="0"/>
+              </a:rPr>
+              <a:t>        </a:t>
+            </a:r>
+            <a:r>
+              <a:rPr lang="en-US" sz="1800" dirty="0" err="1">
+                <a:solidFill>
+                  <a:srgbClr val="0000FF"/>
+                </a:solidFill>
+                <a:latin typeface="Consolas" panose="020B0609020204030204" pitchFamily="49" charset="0"/>
+                <a:ea typeface="Calibri" panose="020F0502020204030204" pitchFamily="34" charset="0"/>
+                <a:cs typeface="Consolas" panose="020B0609020204030204" pitchFamily="49" charset="0"/>
+              </a:rPr>
+              <a:t>foreach</a:t>
+            </a:r>
+            <a:r>
+              <a:rPr lang="en-US" sz="1800" dirty="0">
+                <a:solidFill>
+                  <a:srgbClr val="000000"/>
+                </a:solidFill>
+                <a:latin typeface="Consolas" panose="020B0609020204030204" pitchFamily="49" charset="0"/>
+                <a:ea typeface="Calibri" panose="020F0502020204030204" pitchFamily="34" charset="0"/>
+                <a:cs typeface="Consolas" panose="020B0609020204030204" pitchFamily="49" charset="0"/>
+              </a:rPr>
+              <a:t> (</a:t>
+            </a:r>
+            <a:r>
+              <a:rPr lang="en-US" sz="1800" dirty="0" err="1">
+                <a:solidFill>
+                  <a:srgbClr val="0000FF"/>
+                </a:solidFill>
+                <a:latin typeface="Consolas" panose="020B0609020204030204" pitchFamily="49" charset="0"/>
+                <a:ea typeface="Calibri" panose="020F0502020204030204" pitchFamily="34" charset="0"/>
+                <a:cs typeface="Consolas" panose="020B0609020204030204" pitchFamily="49" charset="0"/>
+              </a:rPr>
+              <a:t>var</a:t>
+            </a:r>
+            <a:r>
+              <a:rPr lang="en-US" sz="1800" dirty="0">
+                <a:solidFill>
+                  <a:srgbClr val="000000"/>
+                </a:solidFill>
+                <a:latin typeface="Consolas" panose="020B0609020204030204" pitchFamily="49" charset="0"/>
+                <a:ea typeface="Calibri" panose="020F0502020204030204" pitchFamily="34" charset="0"/>
+                <a:cs typeface="Consolas" panose="020B0609020204030204" pitchFamily="49" charset="0"/>
+              </a:rPr>
+              <a:t> item </a:t>
+            </a:r>
+            <a:r>
+              <a:rPr lang="en-US" sz="1800" dirty="0">
+                <a:solidFill>
+                  <a:srgbClr val="0000FF"/>
+                </a:solidFill>
+                <a:latin typeface="Consolas" panose="020B0609020204030204" pitchFamily="49" charset="0"/>
+                <a:ea typeface="Calibri" panose="020F0502020204030204" pitchFamily="34" charset="0"/>
+                <a:cs typeface="Consolas" panose="020B0609020204030204" pitchFamily="49" charset="0"/>
+              </a:rPr>
+              <a:t>in</a:t>
+            </a:r>
+            <a:r>
+              <a:rPr lang="en-US" sz="1800" dirty="0">
+                <a:solidFill>
+                  <a:srgbClr val="000000"/>
+                </a:solidFill>
+                <a:latin typeface="Consolas" panose="020B0609020204030204" pitchFamily="49" charset="0"/>
+                <a:ea typeface="Calibri" panose="020F0502020204030204" pitchFamily="34" charset="0"/>
+                <a:cs typeface="Consolas" panose="020B0609020204030204" pitchFamily="49" charset="0"/>
+              </a:rPr>
+              <a:t> points)</a:t>
+            </a:r>
+            <a:endParaRPr lang="en-US" sz="1800" dirty="0">
+              <a:latin typeface="Consolas" panose="020B0609020204030204" pitchFamily="49" charset="0"/>
+              <a:ea typeface="Calibri" panose="020F0502020204030204" pitchFamily="34" charset="0"/>
+              <a:cs typeface="Consolas" panose="020B0609020204030204" pitchFamily="49" charset="0"/>
+            </a:endParaRPr>
+          </a:p>
+          <a:p>
+            <a:pPr marL="0" marR="0" indent="0">
+              <a:lnSpc>
+                <a:spcPct val="107000"/>
+              </a:lnSpc>
+              <a:spcBef>
+                <a:spcPts val="0"/>
+              </a:spcBef>
+              <a:spcAft>
+                <a:spcPts val="0"/>
+              </a:spcAft>
+              <a:buNone/>
+            </a:pPr>
+            <a:r>
+              <a:rPr lang="en-US" sz="1800" dirty="0">
+                <a:solidFill>
+                  <a:srgbClr val="000000"/>
+                </a:solidFill>
+                <a:latin typeface="Consolas" panose="020B0609020204030204" pitchFamily="49" charset="0"/>
+                <a:ea typeface="Calibri" panose="020F0502020204030204" pitchFamily="34" charset="0"/>
+                <a:cs typeface="Consolas" panose="020B0609020204030204" pitchFamily="49" charset="0"/>
+              </a:rPr>
+              <a:t>            </a:t>
+            </a:r>
+            <a:r>
+              <a:rPr lang="en-US" sz="1800" dirty="0" err="1">
+                <a:solidFill>
+                  <a:srgbClr val="2B91AF"/>
+                </a:solidFill>
+                <a:latin typeface="Consolas" panose="020B0609020204030204" pitchFamily="49" charset="0"/>
+                <a:ea typeface="Calibri" panose="020F0502020204030204" pitchFamily="34" charset="0"/>
+                <a:cs typeface="Consolas" panose="020B0609020204030204" pitchFamily="49" charset="0"/>
+              </a:rPr>
+              <a:t>Console</a:t>
+            </a:r>
+            <a:r>
+              <a:rPr lang="en-US" sz="1800" dirty="0" err="1">
+                <a:solidFill>
+                  <a:srgbClr val="000000"/>
+                </a:solidFill>
+                <a:latin typeface="Consolas" panose="020B0609020204030204" pitchFamily="49" charset="0"/>
+                <a:ea typeface="Calibri" panose="020F0502020204030204" pitchFamily="34" charset="0"/>
+                <a:cs typeface="Consolas" panose="020B0609020204030204" pitchFamily="49" charset="0"/>
+              </a:rPr>
+              <a:t>.WriteLine</a:t>
+            </a:r>
+            <a:r>
+              <a:rPr lang="en-US" sz="1800" dirty="0">
+                <a:solidFill>
+                  <a:srgbClr val="000000"/>
+                </a:solidFill>
+                <a:latin typeface="Consolas" panose="020B0609020204030204" pitchFamily="49" charset="0"/>
+                <a:ea typeface="Calibri" panose="020F0502020204030204" pitchFamily="34" charset="0"/>
+                <a:cs typeface="Consolas" panose="020B0609020204030204" pitchFamily="49" charset="0"/>
+              </a:rPr>
+              <a:t>(item);</a:t>
+            </a:r>
+            <a:endParaRPr lang="en-US" sz="1800" dirty="0">
+              <a:latin typeface="Consolas" panose="020B0609020204030204" pitchFamily="49" charset="0"/>
+              <a:ea typeface="Calibri" panose="020F0502020204030204" pitchFamily="34" charset="0"/>
+              <a:cs typeface="Consolas" panose="020B0609020204030204" pitchFamily="49" charset="0"/>
+            </a:endParaRPr>
+          </a:p>
+          <a:p>
+            <a:pPr marL="0" marR="0" indent="0">
+              <a:lnSpc>
+                <a:spcPct val="107000"/>
+              </a:lnSpc>
+              <a:spcBef>
+                <a:spcPts val="0"/>
+              </a:spcBef>
+              <a:spcAft>
+                <a:spcPts val="0"/>
+              </a:spcAft>
+              <a:buNone/>
+            </a:pPr>
+            <a:r>
+              <a:rPr lang="en-US" sz="1800" dirty="0">
+                <a:solidFill>
+                  <a:srgbClr val="000000"/>
+                </a:solidFill>
+                <a:latin typeface="Consolas" panose="020B0609020204030204" pitchFamily="49" charset="0"/>
+                <a:ea typeface="Calibri" panose="020F0502020204030204" pitchFamily="34" charset="0"/>
+                <a:cs typeface="Consolas" panose="020B0609020204030204" pitchFamily="49" charset="0"/>
+              </a:rPr>
+              <a:t>    } </a:t>
+            </a:r>
+            <a:r>
+              <a:rPr lang="en-US" sz="1800" dirty="0">
+                <a:solidFill>
+                  <a:srgbClr val="0000FF"/>
+                </a:solidFill>
+                <a:latin typeface="Consolas" panose="020B0609020204030204" pitchFamily="49" charset="0"/>
+                <a:ea typeface="Calibri" panose="020F0502020204030204" pitchFamily="34" charset="0"/>
+                <a:cs typeface="Consolas" panose="020B0609020204030204" pitchFamily="49" charset="0"/>
+              </a:rPr>
+              <a:t>catch</a:t>
+            </a:r>
+            <a:r>
+              <a:rPr lang="en-US" sz="1800" dirty="0">
+                <a:solidFill>
+                  <a:srgbClr val="000000"/>
+                </a:solidFill>
+                <a:latin typeface="Consolas" panose="020B0609020204030204" pitchFamily="49" charset="0"/>
+                <a:ea typeface="Calibri" panose="020F0502020204030204" pitchFamily="34" charset="0"/>
+                <a:cs typeface="Consolas" panose="020B0609020204030204" pitchFamily="49" charset="0"/>
+              </a:rPr>
+              <a:t>(</a:t>
+            </a:r>
+            <a:r>
+              <a:rPr lang="en-US" sz="1800" dirty="0" err="1">
+                <a:solidFill>
+                  <a:srgbClr val="2B91AF"/>
+                </a:solidFill>
+                <a:latin typeface="Consolas" panose="020B0609020204030204" pitchFamily="49" charset="0"/>
+                <a:ea typeface="Calibri" panose="020F0502020204030204" pitchFamily="34" charset="0"/>
+                <a:cs typeface="Consolas" panose="020B0609020204030204" pitchFamily="49" charset="0"/>
+              </a:rPr>
+              <a:t>TimeoutException</a:t>
+            </a:r>
+            <a:r>
+              <a:rPr lang="en-US" sz="1800" dirty="0">
+                <a:solidFill>
+                  <a:srgbClr val="000000"/>
+                </a:solidFill>
+                <a:latin typeface="Consolas" panose="020B0609020204030204" pitchFamily="49" charset="0"/>
+                <a:ea typeface="Calibri" panose="020F0502020204030204" pitchFamily="34" charset="0"/>
+                <a:cs typeface="Consolas" panose="020B0609020204030204" pitchFamily="49" charset="0"/>
+              </a:rPr>
+              <a:t> e) </a:t>
+            </a:r>
+            <a:r>
+              <a:rPr lang="en-US" sz="1800" dirty="0" smtClean="0">
+                <a:solidFill>
+                  <a:srgbClr val="0000FF"/>
+                </a:solidFill>
+                <a:latin typeface="Consolas" panose="020B0609020204030204" pitchFamily="49" charset="0"/>
+                <a:ea typeface="Calibri" panose="020F0502020204030204" pitchFamily="34" charset="0"/>
+                <a:cs typeface="Consolas" panose="020B0609020204030204" pitchFamily="49" charset="0"/>
+              </a:rPr>
+              <a:t>when</a:t>
+            </a:r>
+            <a:r>
+              <a:rPr lang="en-US" sz="1800" dirty="0" smtClean="0">
+                <a:solidFill>
+                  <a:srgbClr val="000000"/>
+                </a:solidFill>
+                <a:latin typeface="Consolas" panose="020B0609020204030204" pitchFamily="49" charset="0"/>
+                <a:ea typeface="Calibri" panose="020F0502020204030204" pitchFamily="34" charset="0"/>
+                <a:cs typeface="Consolas" panose="020B0609020204030204" pitchFamily="49" charset="0"/>
+              </a:rPr>
+              <a:t> </a:t>
+            </a:r>
+            <a:r>
+              <a:rPr lang="en-US" sz="1800" dirty="0">
+                <a:solidFill>
+                  <a:srgbClr val="000000"/>
+                </a:solidFill>
+                <a:latin typeface="Consolas" panose="020B0609020204030204" pitchFamily="49" charset="0"/>
+                <a:ea typeface="Calibri" panose="020F0502020204030204" pitchFamily="34" charset="0"/>
+                <a:cs typeface="Consolas" panose="020B0609020204030204" pitchFamily="49" charset="0"/>
+              </a:rPr>
+              <a:t>(failures++ &lt; 10)</a:t>
+            </a:r>
+            <a:endParaRPr lang="en-US" sz="1800" dirty="0">
+              <a:latin typeface="Consolas" panose="020B0609020204030204" pitchFamily="49" charset="0"/>
+              <a:ea typeface="Calibri" panose="020F0502020204030204" pitchFamily="34" charset="0"/>
+              <a:cs typeface="Consolas" panose="020B0609020204030204" pitchFamily="49" charset="0"/>
+            </a:endParaRPr>
+          </a:p>
+          <a:p>
+            <a:pPr marL="0" marR="0" indent="0">
+              <a:lnSpc>
+                <a:spcPct val="107000"/>
+              </a:lnSpc>
+              <a:spcBef>
+                <a:spcPts val="0"/>
+              </a:spcBef>
+              <a:spcAft>
+                <a:spcPts val="0"/>
+              </a:spcAft>
+              <a:buNone/>
+            </a:pPr>
+            <a:r>
+              <a:rPr lang="en-US" sz="1800" dirty="0">
+                <a:solidFill>
+                  <a:srgbClr val="000000"/>
+                </a:solidFill>
+                <a:latin typeface="Consolas" panose="020B0609020204030204" pitchFamily="49" charset="0"/>
+                <a:ea typeface="Calibri" panose="020F0502020204030204" pitchFamily="34" charset="0"/>
+                <a:cs typeface="Consolas" panose="020B0609020204030204" pitchFamily="49" charset="0"/>
+              </a:rPr>
+              <a:t>    {</a:t>
+            </a:r>
+            <a:endParaRPr lang="en-US" sz="1800" dirty="0">
+              <a:latin typeface="Consolas" panose="020B0609020204030204" pitchFamily="49" charset="0"/>
+              <a:ea typeface="Calibri" panose="020F0502020204030204" pitchFamily="34" charset="0"/>
+              <a:cs typeface="Consolas" panose="020B0609020204030204" pitchFamily="49" charset="0"/>
+            </a:endParaRPr>
+          </a:p>
+          <a:p>
+            <a:pPr marL="0" marR="0" indent="0">
+              <a:lnSpc>
+                <a:spcPct val="107000"/>
+              </a:lnSpc>
+              <a:spcBef>
+                <a:spcPts val="0"/>
+              </a:spcBef>
+              <a:spcAft>
+                <a:spcPts val="0"/>
+              </a:spcAft>
+              <a:buNone/>
+            </a:pPr>
+            <a:r>
+              <a:rPr lang="en-US" sz="1800" dirty="0">
+                <a:solidFill>
+                  <a:srgbClr val="000000"/>
+                </a:solidFill>
+                <a:latin typeface="Consolas" panose="020B0609020204030204" pitchFamily="49" charset="0"/>
+                <a:ea typeface="Calibri" panose="020F0502020204030204" pitchFamily="34" charset="0"/>
+                <a:cs typeface="Consolas" panose="020B0609020204030204" pitchFamily="49" charset="0"/>
+              </a:rPr>
+              <a:t>        </a:t>
+            </a:r>
+            <a:r>
+              <a:rPr lang="en-US" sz="1800" dirty="0" err="1">
+                <a:solidFill>
+                  <a:srgbClr val="000000"/>
+                </a:solidFill>
+                <a:latin typeface="Consolas" panose="020B0609020204030204" pitchFamily="49" charset="0"/>
+                <a:ea typeface="Calibri" panose="020F0502020204030204" pitchFamily="34" charset="0"/>
+                <a:cs typeface="Consolas" panose="020B0609020204030204" pitchFamily="49" charset="0"/>
+              </a:rPr>
+              <a:t>WriteLine</a:t>
+            </a:r>
+            <a:r>
+              <a:rPr lang="en-US" sz="1800" dirty="0">
+                <a:solidFill>
+                  <a:srgbClr val="000000"/>
+                </a:solidFill>
+                <a:latin typeface="Consolas" panose="020B0609020204030204" pitchFamily="49" charset="0"/>
+                <a:ea typeface="Calibri" panose="020F0502020204030204" pitchFamily="34" charset="0"/>
+                <a:cs typeface="Consolas" panose="020B0609020204030204" pitchFamily="49" charset="0"/>
+              </a:rPr>
+              <a:t>(</a:t>
+            </a:r>
+            <a:r>
+              <a:rPr lang="en-US" sz="1800" dirty="0">
+                <a:solidFill>
+                  <a:srgbClr val="A31515"/>
+                </a:solidFill>
+                <a:latin typeface="Consolas" panose="020B0609020204030204" pitchFamily="49" charset="0"/>
+                <a:ea typeface="Calibri" panose="020F0502020204030204" pitchFamily="34" charset="0"/>
+                <a:cs typeface="Consolas" panose="020B0609020204030204" pitchFamily="49" charset="0"/>
+              </a:rPr>
+              <a:t>"Timeout error: trying again"</a:t>
+            </a:r>
+            <a:r>
+              <a:rPr lang="en-US" sz="1800" dirty="0">
+                <a:solidFill>
+                  <a:srgbClr val="000000"/>
+                </a:solidFill>
+                <a:latin typeface="Consolas" panose="020B0609020204030204" pitchFamily="49" charset="0"/>
+                <a:ea typeface="Calibri" panose="020F0502020204030204" pitchFamily="34" charset="0"/>
+                <a:cs typeface="Consolas" panose="020B0609020204030204" pitchFamily="49" charset="0"/>
+              </a:rPr>
+              <a:t>);</a:t>
+            </a:r>
+            <a:endParaRPr lang="en-US" sz="1800" dirty="0">
+              <a:latin typeface="Consolas" panose="020B0609020204030204" pitchFamily="49" charset="0"/>
+              <a:ea typeface="Calibri" panose="020F0502020204030204" pitchFamily="34" charset="0"/>
+              <a:cs typeface="Consolas" panose="020B0609020204030204" pitchFamily="49" charset="0"/>
+            </a:endParaRPr>
+          </a:p>
+          <a:p>
+            <a:pPr marL="0" marR="0" indent="0">
+              <a:lnSpc>
+                <a:spcPct val="107000"/>
+              </a:lnSpc>
+              <a:spcBef>
+                <a:spcPts val="0"/>
+              </a:spcBef>
+              <a:spcAft>
+                <a:spcPts val="0"/>
+              </a:spcAft>
+              <a:buNone/>
+            </a:pPr>
+            <a:r>
+              <a:rPr lang="en-US" sz="1800" dirty="0">
+                <a:solidFill>
+                  <a:srgbClr val="000000"/>
+                </a:solidFill>
+                <a:latin typeface="Consolas" panose="020B0609020204030204" pitchFamily="49" charset="0"/>
+                <a:ea typeface="Calibri" panose="020F0502020204030204" pitchFamily="34" charset="0"/>
+                <a:cs typeface="Consolas" panose="020B0609020204030204" pitchFamily="49" charset="0"/>
+              </a:rPr>
+              <a:t>    }</a:t>
+            </a:r>
+            <a:endParaRPr lang="en-US" sz="1800" dirty="0">
+              <a:latin typeface="Consolas" panose="020B0609020204030204" pitchFamily="49" charset="0"/>
+              <a:ea typeface="Calibri" panose="020F0502020204030204" pitchFamily="34" charset="0"/>
+              <a:cs typeface="Consolas" panose="020B0609020204030204" pitchFamily="49" charset="0"/>
+            </a:endParaRPr>
+          </a:p>
+          <a:p>
+            <a:pPr marL="0" marR="0" indent="0">
+              <a:lnSpc>
+                <a:spcPct val="107000"/>
+              </a:lnSpc>
+              <a:spcBef>
+                <a:spcPts val="0"/>
+              </a:spcBef>
+              <a:spcAft>
+                <a:spcPts val="0"/>
+              </a:spcAft>
+              <a:buNone/>
+            </a:pPr>
+            <a:r>
+              <a:rPr lang="en-US" sz="1800" dirty="0">
+                <a:solidFill>
+                  <a:srgbClr val="000000"/>
+                </a:solidFill>
+                <a:latin typeface="Consolas" panose="020B0609020204030204" pitchFamily="49" charset="0"/>
+                <a:ea typeface="Calibri" panose="020F0502020204030204" pitchFamily="34" charset="0"/>
+                <a:cs typeface="Consolas" panose="020B0609020204030204" pitchFamily="49" charset="0"/>
+              </a:rPr>
+              <a:t>}</a:t>
+            </a:r>
+            <a:endParaRPr lang="en-US" sz="1800" dirty="0">
+              <a:latin typeface="Consolas" panose="020B0609020204030204" pitchFamily="49" charset="0"/>
+              <a:ea typeface="Calibri" panose="020F0502020204030204" pitchFamily="34" charset="0"/>
+              <a:cs typeface="Consolas" panose="020B0609020204030204" pitchFamily="49" charset="0"/>
+            </a:endParaRPr>
+          </a:p>
+          <a:p>
+            <a:pPr marL="45720" indent="0">
+              <a:buNone/>
+            </a:pPr>
+            <a:endParaRPr lang="en-US" sz="1800" dirty="0">
+              <a:latin typeface="Consolas" panose="020B0609020204030204" pitchFamily="49" charset="0"/>
+              <a:cs typeface="Consolas" panose="020B0609020204030204" pitchFamily="49" charset="0"/>
+            </a:endParaRPr>
+          </a:p>
+        </p:txBody>
+      </p:sp>
+      <p:sp>
+        <p:nvSpPr>
+          <p:cNvPr id="8" name="Content Placeholder 2"/>
+          <p:cNvSpPr>
+            <a:spLocks noGrp="1"/>
+          </p:cNvSpPr>
+          <p:nvPr>
+            <p:ph idx="4294967295"/>
+          </p:nvPr>
+        </p:nvSpPr>
+        <p:spPr>
+          <a:xfrm>
+            <a:off x="6923062" y="3132667"/>
+            <a:ext cx="5265763" cy="3725333"/>
+          </a:xfrm>
+          <a:prstGeom prst="rect">
+            <a:avLst/>
+          </a:prstGeom>
+        </p:spPr>
+        <p:txBody>
+          <a:bodyPr/>
+          <a:lstStyle/>
+          <a:p>
+            <a:pPr marL="0" marR="0" indent="0">
+              <a:lnSpc>
+                <a:spcPct val="107000"/>
+              </a:lnSpc>
+              <a:spcBef>
+                <a:spcPts val="0"/>
+              </a:spcBef>
+              <a:spcAft>
+                <a:spcPts val="0"/>
+              </a:spcAft>
+              <a:buNone/>
+            </a:pPr>
+            <a:r>
+              <a:rPr lang="en-US" sz="1800" dirty="0">
+                <a:solidFill>
+                  <a:srgbClr val="0000FF"/>
+                </a:solidFill>
+                <a:highlight>
+                  <a:srgbClr val="FFFFFF"/>
+                </a:highlight>
+                <a:latin typeface="Consolas" panose="020B0609020204030204" pitchFamily="49" charset="0"/>
+                <a:ea typeface="Calibri" panose="020F0502020204030204" pitchFamily="34" charset="0"/>
+                <a:cs typeface="Times New Roman" panose="02020603050405020304" pitchFamily="18" charset="0"/>
+              </a:rPr>
+              <a:t>private</a:t>
+            </a:r>
+            <a:r>
+              <a:rPr lang="en-US" sz="1800" dirty="0">
+                <a:solidFill>
+                  <a:srgbClr val="000000"/>
+                </a:solidFill>
+                <a:highlight>
+                  <a:srgbClr val="FFFFFF"/>
+                </a:highlight>
+                <a:latin typeface="Consolas" panose="020B0609020204030204" pitchFamily="49" charset="0"/>
+                <a:ea typeface="Calibri" panose="020F0502020204030204" pitchFamily="34" charset="0"/>
+                <a:cs typeface="Times New Roman" panose="02020603050405020304" pitchFamily="18" charset="0"/>
+              </a:rPr>
+              <a:t> </a:t>
+            </a:r>
+            <a:r>
+              <a:rPr lang="en-US" sz="1800" dirty="0" err="1">
+                <a:solidFill>
+                  <a:srgbClr val="0000FF"/>
+                </a:solidFill>
+                <a:highlight>
+                  <a:srgbClr val="FFFFFF"/>
+                </a:highlight>
+                <a:latin typeface="Consolas" panose="020B0609020204030204" pitchFamily="49" charset="0"/>
+                <a:ea typeface="Calibri" panose="020F0502020204030204" pitchFamily="34" charset="0"/>
+                <a:cs typeface="Times New Roman" panose="02020603050405020304" pitchFamily="18" charset="0"/>
+              </a:rPr>
+              <a:t>async</a:t>
+            </a:r>
+            <a:r>
+              <a:rPr lang="en-US" sz="1800" dirty="0">
+                <a:solidFill>
+                  <a:srgbClr val="000000"/>
+                </a:solidFill>
+                <a:highlight>
+                  <a:srgbClr val="FFFFFF"/>
+                </a:highlight>
+                <a:latin typeface="Consolas" panose="020B0609020204030204" pitchFamily="49" charset="0"/>
+                <a:ea typeface="Calibri" panose="020F0502020204030204" pitchFamily="34" charset="0"/>
+                <a:cs typeface="Times New Roman" panose="02020603050405020304" pitchFamily="18" charset="0"/>
+              </a:rPr>
+              <a:t> </a:t>
+            </a:r>
+            <a:r>
+              <a:rPr lang="en-US" sz="1800" dirty="0">
+                <a:solidFill>
+                  <a:srgbClr val="0000FF"/>
+                </a:solidFill>
+                <a:highlight>
+                  <a:srgbClr val="FFFFFF"/>
+                </a:highlight>
+                <a:latin typeface="Consolas" panose="020B0609020204030204" pitchFamily="49" charset="0"/>
+                <a:ea typeface="Calibri" panose="020F0502020204030204" pitchFamily="34" charset="0"/>
+                <a:cs typeface="Times New Roman" panose="02020603050405020304" pitchFamily="18" charset="0"/>
+              </a:rPr>
+              <a:t>static</a:t>
+            </a:r>
+            <a:r>
+              <a:rPr lang="en-US" sz="1800" dirty="0">
+                <a:solidFill>
+                  <a:srgbClr val="000000"/>
+                </a:solidFill>
+                <a:highlight>
+                  <a:srgbClr val="FFFFFF"/>
+                </a:highlight>
+                <a:latin typeface="Consolas" panose="020B0609020204030204" pitchFamily="49" charset="0"/>
+                <a:ea typeface="Calibri" panose="020F0502020204030204" pitchFamily="34" charset="0"/>
+                <a:cs typeface="Times New Roman" panose="02020603050405020304" pitchFamily="18" charset="0"/>
+              </a:rPr>
+              <a:t> </a:t>
+            </a:r>
+            <a:r>
+              <a:rPr lang="en-US" sz="1800" dirty="0">
+                <a:solidFill>
+                  <a:srgbClr val="2B91AF"/>
+                </a:solidFill>
+                <a:highlight>
+                  <a:srgbClr val="FFFFFF"/>
+                </a:highlight>
+                <a:latin typeface="Consolas" panose="020B0609020204030204" pitchFamily="49" charset="0"/>
+                <a:ea typeface="Calibri" panose="020F0502020204030204" pitchFamily="34" charset="0"/>
+                <a:cs typeface="Times New Roman" panose="02020603050405020304" pitchFamily="18" charset="0"/>
+              </a:rPr>
+              <a:t>Task</a:t>
+            </a:r>
+            <a:r>
+              <a:rPr lang="en-US" sz="1800" dirty="0">
+                <a:solidFill>
+                  <a:srgbClr val="000000"/>
+                </a:solidFill>
+                <a:highlight>
+                  <a:srgbClr val="FFFFFF"/>
+                </a:highlight>
+                <a:latin typeface="Consolas" panose="020B0609020204030204" pitchFamily="49" charset="0"/>
+                <a:ea typeface="Calibri" panose="020F0502020204030204" pitchFamily="34" charset="0"/>
+                <a:cs typeface="Times New Roman" panose="02020603050405020304" pitchFamily="18" charset="0"/>
+              </a:rPr>
+              <a:t> </a:t>
+            </a:r>
+            <a:r>
+              <a:rPr lang="en-US" sz="1800" dirty="0" err="1">
+                <a:solidFill>
+                  <a:srgbClr val="000000"/>
+                </a:solidFill>
+                <a:highlight>
+                  <a:srgbClr val="FFFFFF"/>
+                </a:highlight>
+                <a:latin typeface="Consolas" panose="020B0609020204030204" pitchFamily="49" charset="0"/>
+                <a:ea typeface="Calibri" panose="020F0502020204030204" pitchFamily="34" charset="0"/>
+                <a:cs typeface="Times New Roman" panose="02020603050405020304" pitchFamily="18" charset="0"/>
+              </a:rPr>
+              <a:t>RunAsyncTest</a:t>
+            </a:r>
+            <a:r>
+              <a:rPr lang="en-US" sz="1800" dirty="0">
+                <a:solidFill>
+                  <a:srgbClr val="000000"/>
+                </a:solidFill>
+                <a:highlight>
+                  <a:srgbClr val="FFFFFF"/>
+                </a:highlight>
+                <a:latin typeface="Consolas" panose="020B0609020204030204" pitchFamily="49" charset="0"/>
+                <a:ea typeface="Calibri" panose="020F0502020204030204" pitchFamily="34" charset="0"/>
+                <a:cs typeface="Times New Roman" panose="02020603050405020304" pitchFamily="18" charset="0"/>
+              </a:rPr>
+              <a:t>()</a:t>
+            </a:r>
+            <a:endParaRPr lang="en-US" sz="1800" dirty="0">
+              <a:latin typeface="Calibri" panose="020F0502020204030204" pitchFamily="34" charset="0"/>
+              <a:ea typeface="Calibri" panose="020F0502020204030204" pitchFamily="34" charset="0"/>
+              <a:cs typeface="Times New Roman" panose="02020603050405020304" pitchFamily="18" charset="0"/>
+            </a:endParaRPr>
+          </a:p>
+          <a:p>
+            <a:pPr marL="0" marR="0" indent="0">
+              <a:lnSpc>
+                <a:spcPct val="107000"/>
+              </a:lnSpc>
+              <a:spcBef>
+                <a:spcPts val="0"/>
+              </a:spcBef>
+              <a:spcAft>
+                <a:spcPts val="0"/>
+              </a:spcAft>
+              <a:buNone/>
+            </a:pPr>
+            <a:r>
+              <a:rPr lang="en-US" sz="1800" dirty="0">
+                <a:solidFill>
+                  <a:srgbClr val="000000"/>
+                </a:solidFill>
+                <a:highlight>
+                  <a:srgbClr val="FFFFFF"/>
+                </a:highlight>
+                <a:latin typeface="Consolas" panose="020B0609020204030204" pitchFamily="49" charset="0"/>
+                <a:ea typeface="Calibri" panose="020F0502020204030204" pitchFamily="34" charset="0"/>
+                <a:cs typeface="Times New Roman" panose="02020603050405020304" pitchFamily="18" charset="0"/>
+              </a:rPr>
+              <a:t>{</a:t>
+            </a:r>
+            <a:endParaRPr lang="en-US" sz="1800" dirty="0">
+              <a:latin typeface="Calibri" panose="020F0502020204030204" pitchFamily="34" charset="0"/>
+              <a:ea typeface="Calibri" panose="020F0502020204030204" pitchFamily="34" charset="0"/>
+              <a:cs typeface="Times New Roman" panose="02020603050405020304" pitchFamily="18" charset="0"/>
+            </a:endParaRPr>
+          </a:p>
+          <a:p>
+            <a:pPr marL="0" marR="0" indent="0">
+              <a:lnSpc>
+                <a:spcPct val="107000"/>
+              </a:lnSpc>
+              <a:spcBef>
+                <a:spcPts val="0"/>
+              </a:spcBef>
+              <a:spcAft>
+                <a:spcPts val="0"/>
+              </a:spcAft>
+              <a:buNone/>
+            </a:pPr>
+            <a:r>
+              <a:rPr lang="en-US" sz="1800" dirty="0">
+                <a:solidFill>
+                  <a:srgbClr val="000000"/>
+                </a:solidFill>
+                <a:highlight>
+                  <a:srgbClr val="FFFFFF"/>
+                </a:highlight>
+                <a:latin typeface="Consolas" panose="020B0609020204030204" pitchFamily="49" charset="0"/>
+                <a:ea typeface="Calibri" panose="020F0502020204030204" pitchFamily="34" charset="0"/>
+                <a:cs typeface="Times New Roman" panose="02020603050405020304" pitchFamily="18" charset="0"/>
+              </a:rPr>
+              <a:t>    </a:t>
+            </a:r>
+            <a:r>
+              <a:rPr lang="en-US" sz="1800" dirty="0">
+                <a:solidFill>
+                  <a:srgbClr val="0000FF"/>
+                </a:solidFill>
+                <a:highlight>
+                  <a:srgbClr val="FFFFFF"/>
+                </a:highlight>
+                <a:latin typeface="Consolas" panose="020B0609020204030204" pitchFamily="49" charset="0"/>
+                <a:ea typeface="Calibri" panose="020F0502020204030204" pitchFamily="34" charset="0"/>
+                <a:cs typeface="Times New Roman" panose="02020603050405020304" pitchFamily="18" charset="0"/>
+              </a:rPr>
+              <a:t>try</a:t>
+            </a:r>
+            <a:endParaRPr lang="en-US" sz="1800" dirty="0">
+              <a:latin typeface="Calibri" panose="020F0502020204030204" pitchFamily="34" charset="0"/>
+              <a:ea typeface="Calibri" panose="020F0502020204030204" pitchFamily="34" charset="0"/>
+              <a:cs typeface="Times New Roman" panose="02020603050405020304" pitchFamily="18" charset="0"/>
+            </a:endParaRPr>
+          </a:p>
+          <a:p>
+            <a:pPr marL="0" marR="0" indent="0">
+              <a:lnSpc>
+                <a:spcPct val="107000"/>
+              </a:lnSpc>
+              <a:spcBef>
+                <a:spcPts val="0"/>
+              </a:spcBef>
+              <a:spcAft>
+                <a:spcPts val="0"/>
+              </a:spcAft>
+              <a:buNone/>
+            </a:pPr>
+            <a:r>
+              <a:rPr lang="en-US" sz="1800" dirty="0">
+                <a:solidFill>
+                  <a:srgbClr val="000000"/>
+                </a:solidFill>
+                <a:highlight>
+                  <a:srgbClr val="FFFFFF"/>
+                </a:highlight>
+                <a:latin typeface="Consolas" panose="020B0609020204030204" pitchFamily="49" charset="0"/>
+                <a:ea typeface="Calibri" panose="020F0502020204030204" pitchFamily="34" charset="0"/>
+                <a:cs typeface="Times New Roman" panose="02020603050405020304" pitchFamily="18" charset="0"/>
+              </a:rPr>
+              <a:t>    {</a:t>
+            </a:r>
+            <a:endParaRPr lang="en-US" sz="1800" dirty="0">
+              <a:latin typeface="Calibri" panose="020F0502020204030204" pitchFamily="34" charset="0"/>
+              <a:ea typeface="Calibri" panose="020F0502020204030204" pitchFamily="34" charset="0"/>
+              <a:cs typeface="Times New Roman" panose="02020603050405020304" pitchFamily="18" charset="0"/>
+            </a:endParaRPr>
+          </a:p>
+          <a:p>
+            <a:pPr marL="0" marR="0" indent="0">
+              <a:lnSpc>
+                <a:spcPct val="107000"/>
+              </a:lnSpc>
+              <a:spcBef>
+                <a:spcPts val="0"/>
+              </a:spcBef>
+              <a:spcAft>
+                <a:spcPts val="0"/>
+              </a:spcAft>
+              <a:buNone/>
+            </a:pPr>
+            <a:r>
+              <a:rPr lang="en-US" sz="1800" dirty="0">
+                <a:solidFill>
+                  <a:srgbClr val="000000"/>
+                </a:solidFill>
+                <a:highlight>
+                  <a:srgbClr val="FFFFFF"/>
+                </a:highlight>
+                <a:latin typeface="Consolas" panose="020B0609020204030204" pitchFamily="49" charset="0"/>
+                <a:ea typeface="Calibri" panose="020F0502020204030204" pitchFamily="34" charset="0"/>
+                <a:cs typeface="Times New Roman" panose="02020603050405020304" pitchFamily="18" charset="0"/>
+              </a:rPr>
+              <a:t>        </a:t>
+            </a:r>
+            <a:r>
+              <a:rPr lang="en-US" sz="1800" dirty="0">
+                <a:solidFill>
+                  <a:srgbClr val="0000FF"/>
+                </a:solidFill>
+                <a:highlight>
+                  <a:srgbClr val="FFFFFF"/>
+                </a:highlight>
+                <a:latin typeface="Consolas" panose="020B0609020204030204" pitchFamily="49" charset="0"/>
+                <a:ea typeface="Calibri" panose="020F0502020204030204" pitchFamily="34" charset="0"/>
+                <a:cs typeface="Times New Roman" panose="02020603050405020304" pitchFamily="18" charset="0"/>
+              </a:rPr>
+              <a:t>await</a:t>
+            </a:r>
+            <a:r>
+              <a:rPr lang="en-US" sz="1800" dirty="0">
+                <a:solidFill>
+                  <a:srgbClr val="000000"/>
+                </a:solidFill>
+                <a:highlight>
+                  <a:srgbClr val="FFFFFF"/>
+                </a:highlight>
+                <a:latin typeface="Consolas" panose="020B0609020204030204" pitchFamily="49" charset="0"/>
+                <a:ea typeface="Calibri" panose="020F0502020204030204" pitchFamily="34" charset="0"/>
+                <a:cs typeface="Times New Roman" panose="02020603050405020304" pitchFamily="18" charset="0"/>
+              </a:rPr>
+              <a:t> </a:t>
+            </a:r>
+            <a:r>
+              <a:rPr lang="en-US" sz="1800" dirty="0" err="1">
+                <a:solidFill>
+                  <a:srgbClr val="000000"/>
+                </a:solidFill>
+                <a:highlight>
+                  <a:srgbClr val="FFFFFF"/>
+                </a:highlight>
+                <a:latin typeface="Consolas" panose="020B0609020204030204" pitchFamily="49" charset="0"/>
+                <a:ea typeface="Calibri" panose="020F0502020204030204" pitchFamily="34" charset="0"/>
+                <a:cs typeface="Times New Roman" panose="02020603050405020304" pitchFamily="18" charset="0"/>
+              </a:rPr>
+              <a:t>DoWebbyThings</a:t>
+            </a:r>
+            <a:r>
+              <a:rPr lang="en-US" sz="1800" dirty="0">
+                <a:solidFill>
+                  <a:srgbClr val="000000"/>
+                </a:solidFill>
+                <a:highlight>
+                  <a:srgbClr val="FFFFFF"/>
+                </a:highlight>
+                <a:latin typeface="Consolas" panose="020B0609020204030204" pitchFamily="49" charset="0"/>
+                <a:ea typeface="Calibri" panose="020F0502020204030204" pitchFamily="34" charset="0"/>
+                <a:cs typeface="Times New Roman" panose="02020603050405020304" pitchFamily="18" charset="0"/>
+              </a:rPr>
+              <a:t>();</a:t>
+            </a:r>
+            <a:endParaRPr lang="en-US" sz="1800" dirty="0">
+              <a:latin typeface="Calibri" panose="020F0502020204030204" pitchFamily="34" charset="0"/>
+              <a:ea typeface="Calibri" panose="020F0502020204030204" pitchFamily="34" charset="0"/>
+              <a:cs typeface="Times New Roman" panose="02020603050405020304" pitchFamily="18" charset="0"/>
+            </a:endParaRPr>
+          </a:p>
+          <a:p>
+            <a:pPr marL="0" marR="0" indent="0">
+              <a:lnSpc>
+                <a:spcPct val="107000"/>
+              </a:lnSpc>
+              <a:spcBef>
+                <a:spcPts val="0"/>
+              </a:spcBef>
+              <a:spcAft>
+                <a:spcPts val="0"/>
+              </a:spcAft>
+              <a:buNone/>
+            </a:pPr>
+            <a:r>
+              <a:rPr lang="en-US" sz="1800" dirty="0">
+                <a:solidFill>
+                  <a:srgbClr val="000000"/>
+                </a:solidFill>
+                <a:highlight>
+                  <a:srgbClr val="FFFFFF"/>
+                </a:highlight>
+                <a:latin typeface="Consolas" panose="020B0609020204030204" pitchFamily="49" charset="0"/>
+                <a:ea typeface="Calibri" panose="020F0502020204030204" pitchFamily="34" charset="0"/>
+                <a:cs typeface="Times New Roman" panose="02020603050405020304" pitchFamily="18" charset="0"/>
+              </a:rPr>
+              <a:t>    }</a:t>
+            </a:r>
+            <a:endParaRPr lang="en-US" sz="1800" dirty="0">
+              <a:latin typeface="Calibri" panose="020F0502020204030204" pitchFamily="34" charset="0"/>
+              <a:ea typeface="Calibri" panose="020F0502020204030204" pitchFamily="34" charset="0"/>
+              <a:cs typeface="Times New Roman" panose="02020603050405020304" pitchFamily="18" charset="0"/>
+            </a:endParaRPr>
+          </a:p>
+          <a:p>
+            <a:pPr marL="0" marR="0" indent="0">
+              <a:lnSpc>
+                <a:spcPct val="107000"/>
+              </a:lnSpc>
+              <a:spcBef>
+                <a:spcPts val="0"/>
+              </a:spcBef>
+              <a:spcAft>
+                <a:spcPts val="0"/>
+              </a:spcAft>
+              <a:buNone/>
+            </a:pPr>
+            <a:r>
+              <a:rPr lang="en-US" sz="1800" dirty="0">
+                <a:solidFill>
+                  <a:srgbClr val="000000"/>
+                </a:solidFill>
+                <a:highlight>
+                  <a:srgbClr val="FFFFFF"/>
+                </a:highlight>
+                <a:latin typeface="Consolas" panose="020B0609020204030204" pitchFamily="49" charset="0"/>
+                <a:ea typeface="Calibri" panose="020F0502020204030204" pitchFamily="34" charset="0"/>
+                <a:cs typeface="Times New Roman" panose="02020603050405020304" pitchFamily="18" charset="0"/>
+              </a:rPr>
+              <a:t>    </a:t>
+            </a:r>
+            <a:r>
+              <a:rPr lang="en-US" sz="1800" dirty="0">
+                <a:solidFill>
+                  <a:srgbClr val="0000FF"/>
+                </a:solidFill>
+                <a:highlight>
+                  <a:srgbClr val="FFFFFF"/>
+                </a:highlight>
+                <a:latin typeface="Consolas" panose="020B0609020204030204" pitchFamily="49" charset="0"/>
+                <a:ea typeface="Calibri" panose="020F0502020204030204" pitchFamily="34" charset="0"/>
+                <a:cs typeface="Times New Roman" panose="02020603050405020304" pitchFamily="18" charset="0"/>
+              </a:rPr>
+              <a:t>catch</a:t>
+            </a:r>
+            <a:r>
+              <a:rPr lang="en-US" sz="1800" dirty="0">
+                <a:solidFill>
+                  <a:srgbClr val="000000"/>
+                </a:solidFill>
+                <a:highlight>
+                  <a:srgbClr val="FFFFFF"/>
+                </a:highlight>
+                <a:latin typeface="Consolas" panose="020B0609020204030204" pitchFamily="49" charset="0"/>
+                <a:ea typeface="Calibri" panose="020F0502020204030204" pitchFamily="34" charset="0"/>
+                <a:cs typeface="Times New Roman" panose="02020603050405020304" pitchFamily="18" charset="0"/>
+              </a:rPr>
+              <a:t> (</a:t>
+            </a:r>
+            <a:r>
+              <a:rPr lang="en-US" sz="1800" dirty="0">
+                <a:solidFill>
+                  <a:srgbClr val="2B91AF"/>
+                </a:solidFill>
+                <a:highlight>
+                  <a:srgbClr val="FFFFFF"/>
+                </a:highlight>
+                <a:latin typeface="Consolas" panose="020B0609020204030204" pitchFamily="49" charset="0"/>
+                <a:ea typeface="Calibri" panose="020F0502020204030204" pitchFamily="34" charset="0"/>
+                <a:cs typeface="Times New Roman" panose="02020603050405020304" pitchFamily="18" charset="0"/>
+              </a:rPr>
+              <a:t>Exception</a:t>
+            </a:r>
+            <a:r>
+              <a:rPr lang="en-US" sz="1800" dirty="0">
+                <a:solidFill>
+                  <a:srgbClr val="000000"/>
+                </a:solidFill>
+                <a:highlight>
+                  <a:srgbClr val="FFFFFF"/>
+                </a:highlight>
+                <a:latin typeface="Consolas" panose="020B0609020204030204" pitchFamily="49" charset="0"/>
+                <a:ea typeface="Calibri" panose="020F0502020204030204" pitchFamily="34" charset="0"/>
+                <a:cs typeface="Times New Roman" panose="02020603050405020304" pitchFamily="18" charset="0"/>
+              </a:rPr>
+              <a:t> e)</a:t>
+            </a:r>
+            <a:endParaRPr lang="en-US" sz="1800" dirty="0">
+              <a:latin typeface="Calibri" panose="020F0502020204030204" pitchFamily="34" charset="0"/>
+              <a:ea typeface="Calibri" panose="020F0502020204030204" pitchFamily="34" charset="0"/>
+              <a:cs typeface="Times New Roman" panose="02020603050405020304" pitchFamily="18" charset="0"/>
+            </a:endParaRPr>
+          </a:p>
+          <a:p>
+            <a:pPr marL="0" marR="0" indent="0">
+              <a:lnSpc>
+                <a:spcPct val="107000"/>
+              </a:lnSpc>
+              <a:spcBef>
+                <a:spcPts val="0"/>
+              </a:spcBef>
+              <a:spcAft>
+                <a:spcPts val="0"/>
+              </a:spcAft>
+              <a:buNone/>
+            </a:pPr>
+            <a:r>
+              <a:rPr lang="en-US" sz="1800" dirty="0">
+                <a:solidFill>
+                  <a:srgbClr val="000000"/>
+                </a:solidFill>
+                <a:highlight>
+                  <a:srgbClr val="FFFFFF"/>
+                </a:highlight>
+                <a:latin typeface="Consolas" panose="020B0609020204030204" pitchFamily="49" charset="0"/>
+                <a:ea typeface="Calibri" panose="020F0502020204030204" pitchFamily="34" charset="0"/>
+                <a:cs typeface="Times New Roman" panose="02020603050405020304" pitchFamily="18" charset="0"/>
+              </a:rPr>
+              <a:t>    {</a:t>
+            </a:r>
+            <a:endParaRPr lang="en-US" sz="1800" dirty="0">
+              <a:latin typeface="Calibri" panose="020F0502020204030204" pitchFamily="34" charset="0"/>
+              <a:ea typeface="Calibri" panose="020F0502020204030204" pitchFamily="34" charset="0"/>
+              <a:cs typeface="Times New Roman" panose="02020603050405020304" pitchFamily="18" charset="0"/>
+            </a:endParaRPr>
+          </a:p>
+          <a:p>
+            <a:pPr marL="0" marR="0" indent="0">
+              <a:lnSpc>
+                <a:spcPct val="107000"/>
+              </a:lnSpc>
+              <a:spcBef>
+                <a:spcPts val="0"/>
+              </a:spcBef>
+              <a:spcAft>
+                <a:spcPts val="0"/>
+              </a:spcAft>
+              <a:buNone/>
+            </a:pPr>
+            <a:r>
+              <a:rPr lang="en-US" sz="1800" dirty="0">
+                <a:solidFill>
+                  <a:srgbClr val="000000"/>
+                </a:solidFill>
+                <a:highlight>
+                  <a:srgbClr val="FFFFFF"/>
+                </a:highlight>
+                <a:latin typeface="Consolas" panose="020B0609020204030204" pitchFamily="49" charset="0"/>
+                <a:ea typeface="Calibri" panose="020F0502020204030204" pitchFamily="34" charset="0"/>
+                <a:cs typeface="Times New Roman" panose="02020603050405020304" pitchFamily="18" charset="0"/>
+              </a:rPr>
+              <a:t>        </a:t>
+            </a:r>
+            <a:r>
+              <a:rPr lang="en-US" sz="1800" dirty="0">
+                <a:solidFill>
+                  <a:srgbClr val="0000FF"/>
+                </a:solidFill>
+                <a:highlight>
+                  <a:srgbClr val="FFFFFF"/>
+                </a:highlight>
+                <a:latin typeface="Consolas" panose="020B0609020204030204" pitchFamily="49" charset="0"/>
+                <a:ea typeface="Calibri" panose="020F0502020204030204" pitchFamily="34" charset="0"/>
+                <a:cs typeface="Times New Roman" panose="02020603050405020304" pitchFamily="18" charset="0"/>
+              </a:rPr>
+              <a:t>await</a:t>
+            </a:r>
+            <a:r>
+              <a:rPr lang="en-US" sz="1800" dirty="0">
+                <a:solidFill>
+                  <a:srgbClr val="000000"/>
+                </a:solidFill>
+                <a:highlight>
+                  <a:srgbClr val="FFFFFF"/>
+                </a:highlight>
+                <a:latin typeface="Consolas" panose="020B0609020204030204" pitchFamily="49" charset="0"/>
+                <a:ea typeface="Calibri" panose="020F0502020204030204" pitchFamily="34" charset="0"/>
+                <a:cs typeface="Times New Roman" panose="02020603050405020304" pitchFamily="18" charset="0"/>
+              </a:rPr>
+              <a:t> </a:t>
+            </a:r>
+            <a:r>
+              <a:rPr lang="en-US" sz="1800" dirty="0" err="1">
+                <a:solidFill>
+                  <a:srgbClr val="000000"/>
+                </a:solidFill>
+                <a:highlight>
+                  <a:srgbClr val="FFFFFF"/>
+                </a:highlight>
+                <a:latin typeface="Consolas" panose="020B0609020204030204" pitchFamily="49" charset="0"/>
+                <a:ea typeface="Calibri" panose="020F0502020204030204" pitchFamily="34" charset="0"/>
+                <a:cs typeface="Times New Roman" panose="02020603050405020304" pitchFamily="18" charset="0"/>
+              </a:rPr>
+              <a:t>GenerateLog</a:t>
+            </a:r>
+            <a:r>
+              <a:rPr lang="en-US" sz="1800" dirty="0">
+                <a:solidFill>
+                  <a:srgbClr val="000000"/>
+                </a:solidFill>
+                <a:highlight>
+                  <a:srgbClr val="FFFFFF"/>
+                </a:highlight>
+                <a:latin typeface="Consolas" panose="020B0609020204030204" pitchFamily="49" charset="0"/>
+                <a:ea typeface="Calibri" panose="020F0502020204030204" pitchFamily="34" charset="0"/>
+                <a:cs typeface="Times New Roman" panose="02020603050405020304" pitchFamily="18" charset="0"/>
+              </a:rPr>
+              <a:t>(</a:t>
+            </a:r>
+            <a:r>
+              <a:rPr lang="en-US" sz="1800" dirty="0" err="1">
+                <a:solidFill>
+                  <a:srgbClr val="000000"/>
+                </a:solidFill>
+                <a:highlight>
+                  <a:srgbClr val="FFFFFF"/>
+                </a:highlight>
+                <a:latin typeface="Consolas" panose="020B0609020204030204" pitchFamily="49" charset="0"/>
+                <a:ea typeface="Calibri" panose="020F0502020204030204" pitchFamily="34" charset="0"/>
+                <a:cs typeface="Times New Roman" panose="02020603050405020304" pitchFamily="18" charset="0"/>
+              </a:rPr>
+              <a:t>e.ToString</a:t>
+            </a:r>
+            <a:r>
+              <a:rPr lang="en-US" sz="1800" dirty="0">
+                <a:solidFill>
+                  <a:srgbClr val="000000"/>
+                </a:solidFill>
+                <a:highlight>
+                  <a:srgbClr val="FFFFFF"/>
+                </a:highlight>
+                <a:latin typeface="Consolas" panose="020B0609020204030204" pitchFamily="49" charset="0"/>
+                <a:ea typeface="Calibri" panose="020F0502020204030204" pitchFamily="34" charset="0"/>
+                <a:cs typeface="Times New Roman" panose="02020603050405020304" pitchFamily="18" charset="0"/>
+              </a:rPr>
+              <a:t>());</a:t>
+            </a:r>
+            <a:endParaRPr lang="en-US" sz="1800" dirty="0">
+              <a:latin typeface="Calibri" panose="020F0502020204030204" pitchFamily="34" charset="0"/>
+              <a:ea typeface="Calibri" panose="020F0502020204030204" pitchFamily="34" charset="0"/>
+              <a:cs typeface="Times New Roman" panose="02020603050405020304" pitchFamily="18" charset="0"/>
+            </a:endParaRPr>
+          </a:p>
+          <a:p>
+            <a:pPr marL="0" marR="0" indent="0">
+              <a:lnSpc>
+                <a:spcPct val="107000"/>
+              </a:lnSpc>
+              <a:spcBef>
+                <a:spcPts val="0"/>
+              </a:spcBef>
+              <a:spcAft>
+                <a:spcPts val="0"/>
+              </a:spcAft>
+              <a:buNone/>
+            </a:pPr>
+            <a:r>
+              <a:rPr lang="en-US" sz="1800" dirty="0">
+                <a:solidFill>
+                  <a:srgbClr val="000000"/>
+                </a:solidFill>
+                <a:highlight>
+                  <a:srgbClr val="FFFFFF"/>
+                </a:highlight>
+                <a:latin typeface="Consolas" panose="020B0609020204030204" pitchFamily="49" charset="0"/>
+                <a:ea typeface="Calibri" panose="020F0502020204030204" pitchFamily="34" charset="0"/>
+                <a:cs typeface="Times New Roman" panose="02020603050405020304" pitchFamily="18" charset="0"/>
+              </a:rPr>
+              <a:t>        </a:t>
+            </a:r>
+            <a:r>
+              <a:rPr lang="en-US" sz="1800" dirty="0">
+                <a:solidFill>
+                  <a:srgbClr val="0000FF"/>
+                </a:solidFill>
+                <a:highlight>
+                  <a:srgbClr val="FFFFFF"/>
+                </a:highlight>
+                <a:latin typeface="Consolas" panose="020B0609020204030204" pitchFamily="49" charset="0"/>
+                <a:ea typeface="Calibri" panose="020F0502020204030204" pitchFamily="34" charset="0"/>
+                <a:cs typeface="Times New Roman" panose="02020603050405020304" pitchFamily="18" charset="0"/>
+              </a:rPr>
+              <a:t>throw</a:t>
+            </a:r>
+            <a:r>
+              <a:rPr lang="en-US" sz="1800" dirty="0">
+                <a:solidFill>
+                  <a:srgbClr val="000000"/>
+                </a:solidFill>
+                <a:highlight>
+                  <a:srgbClr val="FFFFFF"/>
+                </a:highlight>
+                <a:latin typeface="Consolas" panose="020B0609020204030204" pitchFamily="49" charset="0"/>
+                <a:ea typeface="Calibri" panose="020F0502020204030204" pitchFamily="34" charset="0"/>
+                <a:cs typeface="Times New Roman" panose="02020603050405020304" pitchFamily="18" charset="0"/>
+              </a:rPr>
+              <a:t>;</a:t>
+            </a:r>
+            <a:endParaRPr lang="en-US" sz="1800" dirty="0">
+              <a:latin typeface="Calibri" panose="020F0502020204030204" pitchFamily="34" charset="0"/>
+              <a:ea typeface="Calibri" panose="020F0502020204030204" pitchFamily="34" charset="0"/>
+              <a:cs typeface="Times New Roman" panose="02020603050405020304" pitchFamily="18" charset="0"/>
+            </a:endParaRPr>
+          </a:p>
+          <a:p>
+            <a:pPr marL="0" marR="0" indent="0">
+              <a:lnSpc>
+                <a:spcPct val="107000"/>
+              </a:lnSpc>
+              <a:spcBef>
+                <a:spcPts val="0"/>
+              </a:spcBef>
+              <a:spcAft>
+                <a:spcPts val="0"/>
+              </a:spcAft>
+              <a:buNone/>
+            </a:pPr>
+            <a:r>
+              <a:rPr lang="en-US" sz="1800" dirty="0">
+                <a:solidFill>
+                  <a:srgbClr val="000000"/>
+                </a:solidFill>
+                <a:highlight>
+                  <a:srgbClr val="FFFFFF"/>
+                </a:highlight>
+                <a:latin typeface="Consolas" panose="020B0609020204030204" pitchFamily="49" charset="0"/>
+                <a:ea typeface="Calibri" panose="020F0502020204030204" pitchFamily="34" charset="0"/>
+                <a:cs typeface="Times New Roman" panose="02020603050405020304" pitchFamily="18" charset="0"/>
+              </a:rPr>
+              <a:t>    }</a:t>
+            </a:r>
+            <a:endParaRPr lang="en-US" sz="1800" dirty="0">
+              <a:latin typeface="Calibri" panose="020F0502020204030204" pitchFamily="34" charset="0"/>
+              <a:ea typeface="Calibri" panose="020F0502020204030204" pitchFamily="34" charset="0"/>
+              <a:cs typeface="Times New Roman" panose="02020603050405020304" pitchFamily="18" charset="0"/>
+            </a:endParaRPr>
+          </a:p>
+          <a:p>
+            <a:pPr marL="0" marR="0" indent="0">
+              <a:lnSpc>
+                <a:spcPct val="107000"/>
+              </a:lnSpc>
+              <a:spcBef>
+                <a:spcPts val="0"/>
+              </a:spcBef>
+              <a:spcAft>
+                <a:spcPts val="0"/>
+              </a:spcAft>
+              <a:buNone/>
+            </a:pPr>
+            <a:r>
+              <a:rPr lang="en-US" sz="1800" dirty="0">
+                <a:solidFill>
+                  <a:srgbClr val="000000"/>
+                </a:solidFill>
+                <a:highlight>
+                  <a:srgbClr val="FFFFFF"/>
+                </a:highlight>
+                <a:latin typeface="Consolas" panose="020B0609020204030204" pitchFamily="49" charset="0"/>
+                <a:ea typeface="Calibri" panose="020F0502020204030204" pitchFamily="34" charset="0"/>
+                <a:cs typeface="Times New Roman" panose="02020603050405020304" pitchFamily="18" charset="0"/>
+              </a:rPr>
+              <a:t>}</a:t>
+            </a:r>
+            <a:endParaRPr lang="en-US" sz="1800" dirty="0">
+              <a:latin typeface="Calibri" panose="020F0502020204030204" pitchFamily="34" charset="0"/>
+              <a:ea typeface="Calibri" panose="020F0502020204030204" pitchFamily="34" charset="0"/>
+              <a:cs typeface="Times New Roman" panose="02020603050405020304" pitchFamily="18" charset="0"/>
+            </a:endParaRPr>
+          </a:p>
+          <a:p>
+            <a:pPr marL="45720" indent="0">
+              <a:buNone/>
+            </a:pPr>
+            <a:endParaRPr lang="en-US" sz="1800" dirty="0"/>
+          </a:p>
+        </p:txBody>
+      </p:sp>
+    </p:spTree>
+    <p:extLst>
+      <p:ext uri="{BB962C8B-B14F-4D97-AF65-F5344CB8AC3E}">
+        <p14:creationId xmlns:p14="http://schemas.microsoft.com/office/powerpoint/2010/main" val="3102671156"/>
+      </p:ext>
+    </p:extLst>
+  </p:cSld>
+  <p:clrMapOvr>
+    <a:masterClrMapping/>
+  </p:clrMapOvr>
+  <p:transition>
+    <p:fade/>
+  </p:transition>
+  <p:timing>
+    <p:tnLst>
+      <p:par>
+        <p:cTn id="1" dur="indefinite" restart="never" nodeType="tmRoot"/>
+      </p:par>
+    </p:tnLst>
+  </p:timing>
+</p:sld>
+</file>
+
+<file path=ppt/slides/slide14.xml><?xml version="1.0" encoding="utf-8"?>
+<p:sld xmlns:a="http://schemas.openxmlformats.org/drawingml/2006/main" xmlns:r="http://schemas.openxmlformats.org/officeDocument/2006/relationships" xmlns:p="http://schemas.openxmlformats.org/presentationml/2006/main">
+  <p:cSld>
+    <p:spTree>
+      <p:nvGrpSpPr>
+        <p:cNvPr id="1" name=""/>
+        <p:cNvGrpSpPr/>
+        <p:nvPr/>
+      </p:nvGrpSpPr>
+      <p:grpSpPr>
+        <a:xfrm>
+          <a:off x="0" y="0"/>
+          <a:ext cx="0" cy="0"/>
+          <a:chOff x="0" y="0"/>
+          <a:chExt cx="0" cy="0"/>
+        </a:xfrm>
+      </p:grpSpPr>
+    </p:spTree>
+    <p:extLst>
+      <p:ext uri="{BB962C8B-B14F-4D97-AF65-F5344CB8AC3E}">
+        <p14:creationId xmlns:p14="http://schemas.microsoft.com/office/powerpoint/2010/main" val="3975503966"/>
+      </p:ext>
+    </p:extLst>
+  </p:cSld>
+  <p:clrMapOvr>
+    <a:masterClrMapping/>
+  </p:clrMapOvr>
+</p:sld>
+</file>
+
 <file path=ppt/slides/slide2.xml><?xml version="1.0" encoding="utf-8"?>
 <p:sld xmlns:a="http://schemas.openxmlformats.org/drawingml/2006/main" xmlns:r="http://schemas.openxmlformats.org/officeDocument/2006/relationships" xmlns:p="http://schemas.openxmlformats.org/presentationml/2006/main">
   <p:cSld>
@@ -8565,7 +10869,11 @@
           </p:cNvGraphicFramePr>
           <p:nvPr>
             <p:ph sz="quarter" idx="10"/>
-            <p:extLst/>
+            <p:extLst>
+              <p:ext uri="{D42A27DB-BD31-4B8C-83A1-F6EECF244321}">
+                <p14:modId xmlns:p14="http://schemas.microsoft.com/office/powerpoint/2010/main" val="1007813976"/>
+              </p:ext>
+            </p:extLst>
           </p:nvPr>
         </p:nvGraphicFramePr>
         <p:xfrm>
@@ -8582,7 +10890,7 @@
                 <a:gridCol w="11521532">
                   <a:extLst>
                     <a:ext uri="{9D8B030D-6E8A-4147-A177-3AD203B41FA5}">
-                      <a16:colId xmlns:a16="http://schemas.microsoft.com/office/drawing/2014/main" xmlns="" val="1632794655"/>
+                      <a16:colId xmlns="" xmlns:a16="http://schemas.microsoft.com/office/drawing/2014/main" val="1632794655"/>
                     </a:ext>
                   </a:extLst>
                 </a:gridCol>
@@ -8610,7 +10918,7 @@
                 </a:tc>
                 <a:extLst>
                   <a:ext uri="{0D108BD9-81ED-4DB2-BD59-A6C34878D82A}">
-                    <a16:rowId xmlns:a16="http://schemas.microsoft.com/office/drawing/2014/main" xmlns="" val="1789177411"/>
+                    <a16:rowId xmlns="" xmlns:a16="http://schemas.microsoft.com/office/drawing/2014/main" val="1789177411"/>
                   </a:ext>
                 </a:extLst>
               </a:tr>
@@ -8645,7 +10953,7 @@
                 </a:tc>
                 <a:extLst>
                   <a:ext uri="{0D108BD9-81ED-4DB2-BD59-A6C34878D82A}">
-                    <a16:rowId xmlns:a16="http://schemas.microsoft.com/office/drawing/2014/main" xmlns="" val="3842815335"/>
+                    <a16:rowId xmlns="" xmlns:a16="http://schemas.microsoft.com/office/drawing/2014/main" val="3842815335"/>
                   </a:ext>
                 </a:extLst>
               </a:tr>
@@ -8689,7 +10997,7 @@
                 </a:tc>
                 <a:extLst>
                   <a:ext uri="{0D108BD9-81ED-4DB2-BD59-A6C34878D82A}">
-                    <a16:rowId xmlns:a16="http://schemas.microsoft.com/office/drawing/2014/main" xmlns="" val="321066646"/>
+                    <a16:rowId xmlns="" xmlns:a16="http://schemas.microsoft.com/office/drawing/2014/main" val="321066646"/>
                   </a:ext>
                 </a:extLst>
               </a:tr>
@@ -8748,7 +11056,7 @@
                 </a:tc>
                 <a:extLst>
                   <a:ext uri="{0D108BD9-81ED-4DB2-BD59-A6C34878D82A}">
-                    <a16:rowId xmlns:a16="http://schemas.microsoft.com/office/drawing/2014/main" xmlns="" val="3812060533"/>
+                    <a16:rowId xmlns="" xmlns:a16="http://schemas.microsoft.com/office/drawing/2014/main" val="3812060533"/>
                   </a:ext>
                 </a:extLst>
               </a:tr>
@@ -8759,21 +11067,21 @@
                     <a:lstStyle/>
                     <a:p>
                       <a:r>
-                        <a:rPr lang="en-US" sz="2400" dirty="0" smtClean="0">
+                        <a:rPr lang="en-US" sz="2400" b="1" i="1" dirty="0" smtClean="0">
                           <a:latin typeface="Segoe UI Light" panose="020B0502040204020203" pitchFamily="34" charset="0"/>
                           <a:cs typeface="Segoe UI Light" panose="020B0502040204020203" pitchFamily="34" charset="0"/>
                         </a:rPr>
                         <a:t>04 | </a:t>
                       </a:r>
                       <a:r>
-                        <a:rPr lang="en-US" sz="2400" dirty="0" smtClean="0"/>
+                        <a:rPr lang="en-US" sz="2400" b="1" i="1" dirty="0" smtClean="0"/>
                         <a:t>Exceptions</a:t>
                       </a:r>
                       <a:r>
-                        <a:rPr lang="en-US" sz="2400" baseline="0" dirty="0" smtClean="0"/>
+                        <a:rPr lang="en-US" sz="2400" b="1" i="1" baseline="0" dirty="0" smtClean="0"/>
                         <a:t> and Error Handling Improvements</a:t>
                       </a:r>
-                      <a:endParaRPr lang="en-US" sz="2400" dirty="0">
+                      <a:endParaRPr lang="en-US" sz="2400" b="1" i="1" dirty="0">
                         <a:latin typeface="Segoe UI Light" panose="020B0502040204020203" pitchFamily="34" charset="0"/>
                         <a:cs typeface="Segoe UI Light" panose="020B0502040204020203" pitchFamily="34" charset="0"/>
                       </a:endParaRPr>
@@ -8783,7 +11091,7 @@
                 </a:tc>
                 <a:extLst>
                   <a:ext uri="{0D108BD9-81ED-4DB2-BD59-A6C34878D82A}">
-                    <a16:rowId xmlns:a16="http://schemas.microsoft.com/office/drawing/2014/main" xmlns="" val="733235577"/>
+                    <a16:rowId xmlns="" xmlns:a16="http://schemas.microsoft.com/office/drawing/2014/main" val="733235577"/>
                   </a:ext>
                 </a:extLst>
               </a:tr>
@@ -8821,7 +11129,7 @@
                 </a:tc>
                 <a:extLst>
                   <a:ext uri="{0D108BD9-81ED-4DB2-BD59-A6C34878D82A}">
-                    <a16:rowId xmlns:a16="http://schemas.microsoft.com/office/drawing/2014/main" xmlns="" val="2343148695"/>
+                    <a16:rowId xmlns="" xmlns:a16="http://schemas.microsoft.com/office/drawing/2014/main" val="2343148695"/>
                   </a:ext>
                 </a:extLst>
               </a:tr>
@@ -8959,6 +11267,150 @@
 </file>
 
 <file path=ppt/slides/slide6.xml><?xml version="1.0" encoding="utf-8"?>
+<p:sld xmlns:a="http://schemas.openxmlformats.org/drawingml/2006/main" xmlns:r="http://schemas.openxmlformats.org/officeDocument/2006/relationships" xmlns:p="http://schemas.openxmlformats.org/presentationml/2006/main">
+  <p:cSld>
+    <p:spTree>
+      <p:nvGrpSpPr>
+        <p:cNvPr id="1" name=""/>
+        <p:cNvGrpSpPr/>
+        <p:nvPr/>
+      </p:nvGrpSpPr>
+      <p:grpSpPr>
+        <a:xfrm>
+          <a:off x="0" y="0"/>
+          <a:ext cx="0" cy="0"/>
+          <a:chOff x="0" y="0"/>
+          <a:chExt cx="0" cy="0"/>
+        </a:xfrm>
+      </p:grpSpPr>
+      <p:sp>
+        <p:nvSpPr>
+          <p:cNvPr id="5" name="Title 4"/>
+          <p:cNvSpPr>
+            <a:spLocks noGrp="1"/>
+          </p:cNvSpPr>
+          <p:nvPr>
+            <p:ph type="title"/>
+          </p:nvPr>
+        </p:nvSpPr>
+        <p:spPr/>
+        <p:txBody>
+          <a:bodyPr/>
+          <a:lstStyle/>
+          <a:p>
+            <a:r>
+              <a:rPr lang="en-US" sz="4800" dirty="0" smtClean="0"/>
+              <a:t>Module Overview</a:t>
+            </a:r>
+            <a:endParaRPr lang="en-US" sz="4800" dirty="0"/>
+          </a:p>
+        </p:txBody>
+      </p:sp>
+      <p:sp>
+        <p:nvSpPr>
+          <p:cNvPr id="2" name="TextBox 1"/>
+          <p:cNvSpPr txBox="1"/>
+          <p:nvPr/>
+        </p:nvSpPr>
+        <p:spPr>
+          <a:xfrm flipH="1">
+            <a:off x="704882" y="2321591"/>
+            <a:ext cx="10450456" cy="1231106"/>
+          </a:xfrm>
+          <a:prstGeom prst="rect">
+            <a:avLst/>
+          </a:prstGeom>
+          <a:noFill/>
+        </p:spPr>
+        <p:txBody>
+          <a:bodyPr wrap="square" lIns="0" tIns="0" rIns="0" bIns="0" rtlCol="0" anchor="ctr">
+            <a:spAutoFit/>
+          </a:bodyPr>
+          <a:lstStyle/>
+          <a:p>
+            <a:pPr marL="857250" indent="-857250">
+              <a:buFont typeface="Arial" panose="020B0604020202020204" pitchFamily="34" charset="0"/>
+              <a:buChar char="•"/>
+            </a:pPr>
+            <a:r>
+              <a:rPr lang="en-US" sz="4000" dirty="0" smtClean="0">
+                <a:ln w="0"/>
+                <a:effectLst>
+                  <a:outerShdw blurRad="38100" dist="19050" dir="2700000" algn="tl" rotWithShape="0">
+                    <a:schemeClr val="dk1">
+                      <a:alpha val="40000"/>
+                    </a:schemeClr>
+                  </a:outerShdw>
+                </a:effectLst>
+              </a:rPr>
+              <a:t>Exception Filters</a:t>
+            </a:r>
+            <a:endParaRPr lang="en-US" sz="4000" dirty="0" smtClean="0">
+              <a:ln w="0"/>
+              <a:effectLst>
+                <a:outerShdw blurRad="38100" dist="19050" dir="2700000" algn="tl" rotWithShape="0">
+                  <a:schemeClr val="dk1">
+                    <a:alpha val="40000"/>
+                  </a:schemeClr>
+                </a:outerShdw>
+              </a:effectLst>
+            </a:endParaRPr>
+          </a:p>
+          <a:p>
+            <a:pPr marL="857250" indent="-857250">
+              <a:buFont typeface="Arial" panose="020B0604020202020204" pitchFamily="34" charset="0"/>
+              <a:buChar char="•"/>
+            </a:pPr>
+            <a:r>
+              <a:rPr lang="en-US" sz="4000" dirty="0" smtClean="0">
+                <a:ln w="0"/>
+                <a:effectLst>
+                  <a:outerShdw blurRad="38100" dist="19050" dir="2700000" algn="tl" rotWithShape="0">
+                    <a:schemeClr val="dk1">
+                      <a:alpha val="40000"/>
+                    </a:schemeClr>
+                  </a:outerShdw>
+                </a:effectLst>
+              </a:rPr>
+              <a:t>Await in catch and finally clauses</a:t>
+            </a:r>
+            <a:endParaRPr lang="en-US" sz="4000" dirty="0" smtClean="0">
+              <a:ln w="0"/>
+              <a:effectLst>
+                <a:outerShdw blurRad="38100" dist="19050" dir="2700000" algn="tl" rotWithShape="0">
+                  <a:schemeClr val="dk1">
+                    <a:alpha val="40000"/>
+                  </a:schemeClr>
+                </a:outerShdw>
+              </a:effectLst>
+            </a:endParaRPr>
+          </a:p>
+        </p:txBody>
+      </p:sp>
+    </p:spTree>
+    <p:extLst>
+      <p:ext uri="{BB962C8B-B14F-4D97-AF65-F5344CB8AC3E}">
+        <p14:creationId xmlns:p14="http://schemas.microsoft.com/office/powerpoint/2010/main" val="892669942"/>
+      </p:ext>
+    </p:extLst>
+  </p:cSld>
+  <p:clrMapOvr>
+    <a:masterClrMapping/>
+  </p:clrMapOvr>
+  <p:transition>
+    <p:fade/>
+  </p:transition>
+  <p:timing>
+    <p:tnLst>
+      <p:par>
+        <p:cTn id="1" dur="indefinite" restart="never" nodeType="tmRoot"/>
+      </p:par>
+    </p:tnLst>
+  </p:timing>
+</p:sld>
+</file>
+
+<file path=ppt/slides/slide7.xml><?xml version="1.0" encoding="utf-8"?>
 <p:sld xmlns:a="http://schemas.openxmlformats.org/drawingml/2006/main" xmlns:r="http://schemas.openxmlformats.org/officeDocument/2006/relationships" xmlns:p="http://schemas.openxmlformats.org/presentationml/2006/main">
   <p:cSld>
     <p:spTree>
@@ -9211,7 +11663,7 @@
 </p:sld>
 </file>
 
-<file path=ppt/slides/slide7.xml><?xml version="1.0" encoding="utf-8"?>
+<file path=ppt/slides/slide8.xml><?xml version="1.0" encoding="utf-8"?>
 <p:sld xmlns:a="http://schemas.openxmlformats.org/drawingml/2006/main" xmlns:r="http://schemas.openxmlformats.org/officeDocument/2006/relationships" xmlns:p="http://schemas.openxmlformats.org/presentationml/2006/main">
   <p:cSld>
     <p:spTree>
@@ -10836,118 +13288,6 @@
     <p:extLst>
       <p:ext uri="{BB962C8B-B14F-4D97-AF65-F5344CB8AC3E}">
         <p14:creationId xmlns:p14="http://schemas.microsoft.com/office/powerpoint/2010/main" val="326740596"/>
-      </p:ext>
-    </p:extLst>
-  </p:cSld>
-  <p:clrMapOvr>
-    <a:masterClrMapping/>
-  </p:clrMapOvr>
-  <p:transition>
-    <p:fade/>
-  </p:transition>
-  <p:timing>
-    <p:tnLst>
-      <p:par>
-        <p:cTn id="1" dur="indefinite" restart="never" nodeType="tmRoot"/>
-      </p:par>
-    </p:tnLst>
-  </p:timing>
-</p:sld>
-</file>
-
-<file path=ppt/slides/slide8.xml><?xml version="1.0" encoding="utf-8"?>
-<p:sld xmlns:a="http://schemas.openxmlformats.org/drawingml/2006/main" xmlns:r="http://schemas.openxmlformats.org/officeDocument/2006/relationships" xmlns:p="http://schemas.openxmlformats.org/presentationml/2006/main">
-  <p:cSld>
-    <p:spTree>
-      <p:nvGrpSpPr>
-        <p:cNvPr id="1" name=""/>
-        <p:cNvGrpSpPr/>
-        <p:nvPr/>
-      </p:nvGrpSpPr>
-      <p:grpSpPr>
-        <a:xfrm>
-          <a:off x="0" y="0"/>
-          <a:ext cx="0" cy="0"/>
-          <a:chOff x="0" y="0"/>
-          <a:chExt cx="0" cy="0"/>
-        </a:xfrm>
-      </p:grpSpPr>
-      <p:sp>
-        <p:nvSpPr>
-          <p:cNvPr id="4" name="Subtitle 3"/>
-          <p:cNvSpPr>
-            <a:spLocks noGrp="1"/>
-          </p:cNvSpPr>
-          <p:nvPr>
-            <p:ph type="subTitle" idx="1"/>
-          </p:nvPr>
-        </p:nvSpPr>
-        <p:spPr/>
-        <p:txBody>
-          <a:bodyPr/>
-          <a:lstStyle/>
-          <a:p>
-            <a:r>
-              <a:rPr lang="en-US" b="0"/>
-              <a:t>https</a:t>
-            </a:r>
-            <a:r>
-              <a:rPr lang="en-US" b="0"/>
-              <a:t>://</a:t>
-            </a:r>
-            <a:r>
-              <a:rPr lang="en-US" b="0" smtClean="0"/>
-              <a:t>github.com/BillWagner/MVA-CSharp6</a:t>
-            </a:r>
-          </a:p>
-          <a:p>
-            <a:r>
-              <a:rPr lang="en-US" smtClean="0"/>
-              <a:t>Expression </a:t>
-            </a:r>
-            <a:r>
-              <a:rPr lang="en-US" dirty="0" smtClean="0"/>
-              <a:t>Bodied Members, Static </a:t>
-            </a:r>
-            <a:r>
-              <a:rPr lang="en-US" dirty="0" err="1" smtClean="0"/>
-              <a:t>Usings</a:t>
-            </a:r>
-            <a:r>
-              <a:rPr lang="en-US" dirty="0" smtClean="0"/>
-              <a:t>, and Elvis</a:t>
-            </a:r>
-            <a:endParaRPr lang="en-US" dirty="0"/>
-          </a:p>
-        </p:txBody>
-      </p:sp>
-      <p:sp>
-        <p:nvSpPr>
-          <p:cNvPr id="2" name="Text Placeholder 1"/>
-          <p:cNvSpPr>
-            <a:spLocks noGrp="1"/>
-          </p:cNvSpPr>
-          <p:nvPr>
-            <p:ph type="body" sz="quarter" idx="10"/>
-          </p:nvPr>
-        </p:nvSpPr>
-        <p:spPr/>
-        <p:txBody>
-          <a:bodyPr/>
-          <a:lstStyle/>
-          <a:p>
-            <a:r>
-              <a:rPr lang="en-US" smtClean="0"/>
-              <a:t>demo</a:t>
-            </a:r>
-            <a:endParaRPr lang="en-US" dirty="0"/>
-          </a:p>
-        </p:txBody>
-      </p:sp>
-    </p:spTree>
-    <p:extLst>
-      <p:ext uri="{BB962C8B-B14F-4D97-AF65-F5344CB8AC3E}">
-        <p14:creationId xmlns:p14="http://schemas.microsoft.com/office/powerpoint/2010/main" val="3993867577"/>
       </p:ext>
     </p:extLst>
   </p:cSld>
@@ -10984,10 +13324,73 @@
           <a:chExt cx="0" cy="0"/>
         </a:xfrm>
       </p:grpSpPr>
+      <p:sp>
+        <p:nvSpPr>
+          <p:cNvPr id="2" name="Text Placeholder 1"/>
+          <p:cNvSpPr>
+            <a:spLocks noGrp="1"/>
+          </p:cNvSpPr>
+          <p:nvPr>
+            <p:ph type="body" sz="quarter" idx="10"/>
+          </p:nvPr>
+        </p:nvSpPr>
+        <p:spPr/>
+        <p:txBody>
+          <a:bodyPr/>
+          <a:lstStyle/>
+          <a:p>
+            <a:r>
+              <a:rPr lang="en-US" sz="3600" dirty="0" smtClean="0">
+                <a:ln w="0"/>
+                <a:effectLst>
+                  <a:outerShdw blurRad="38100" dist="19050" dir="2700000" algn="tl" rotWithShape="0">
+                    <a:schemeClr val="dk1">
+                      <a:alpha val="40000"/>
+                    </a:schemeClr>
+                  </a:outerShdw>
+                </a:effectLst>
+              </a:rPr>
+              <a:t>Exception Filters</a:t>
+            </a:r>
+            <a:endParaRPr lang="en-US" sz="3600" dirty="0">
+              <a:ln w="0"/>
+              <a:effectLst>
+                <a:outerShdw blurRad="38100" dist="19050" dir="2700000" algn="tl" rotWithShape="0">
+                  <a:schemeClr val="dk1">
+                    <a:alpha val="40000"/>
+                  </a:schemeClr>
+                </a:outerShdw>
+              </a:effectLst>
+            </a:endParaRPr>
+          </a:p>
+          <a:p>
+            <a:endParaRPr lang="en-US" dirty="0"/>
+          </a:p>
+        </p:txBody>
+      </p:sp>
+      <p:sp>
+        <p:nvSpPr>
+          <p:cNvPr id="3" name="Subtitle 2"/>
+          <p:cNvSpPr>
+            <a:spLocks noGrp="1"/>
+          </p:cNvSpPr>
+          <p:nvPr>
+            <p:ph type="subTitle" idx="1"/>
+          </p:nvPr>
+        </p:nvSpPr>
+        <p:spPr/>
+        <p:txBody>
+          <a:bodyPr/>
+          <a:lstStyle/>
+          <a:p>
+            <a:endParaRPr lang="en-US"/>
+          </a:p>
+        </p:txBody>
+      </p:sp>
     </p:spTree>
     <p:extLst>
       <p:ext uri="{BB962C8B-B14F-4D97-AF65-F5344CB8AC3E}">
-        <p14:creationId xmlns:p14="http://schemas.microsoft.com/office/powerpoint/2010/main" val="3975503966"/>
+        <p14:creationId xmlns:p14="http://schemas.microsoft.com/office/powerpoint/2010/main" val="3147968138"/>
       </p:ext>
     </p:extLst>
   </p:cSld>
@@ -12140,33 +14543,6 @@
 </file>
 
 <file path=customXml/item1.xml><?xml version="1.0" encoding="utf-8"?>
-<p:properties xmlns:p="http://schemas.microsoft.com/office/2006/metadata/properties" xmlns:xsi="http://www.w3.org/2001/XMLSchema-instance" xmlns:pc="http://schemas.microsoft.com/office/infopath/2007/PartnerControls">
-  <documentManagement>
-    <TaxCatchAll xmlns="230e9df3-be65-4c73-a93b-d1236ebd677e"/>
-    <PublishingExpirationDate xmlns="http://schemas.microsoft.com/sharepoint/v3" xsi:nil="true"/>
-    <PublishingStartDate xmlns="http://schemas.microsoft.com/sharepoint/v3" xsi:nil="true"/>
-    <TaxKeywordTaxHTField xmlns="230e9df3-be65-4c73-a93b-d1236ebd677e">
-      <Terms xmlns="http://schemas.microsoft.com/office/infopath/2007/PartnerControls">
-        <TermInfo xmlns="http://schemas.microsoft.com/office/infopath/2007/PartnerControls">
-          <TermName xmlns="http://schemas.microsoft.com/office/infopath/2007/PartnerControls">&lt;Any Related Keywords&gt;</TermName>
-          <TermId xmlns="http://schemas.microsoft.com/office/infopath/2007/PartnerControls">11111111-1111-1111-1111-111111111111</TermId>
-        </TermInfo>
-      </Terms>
-    </TaxKeywordTaxHTField>
-  </documentManagement>
-</p:properties>
-</file>
-
-<file path=customXml/item2.xml><?xml version="1.0" encoding="utf-8"?>
-<?mso-contentType ?>
-<FormTemplates xmlns="http://schemas.microsoft.com/sharepoint/v3/contenttype/forms">
-  <Display>DocumentLibraryForm</Display>
-  <Edit>DocumentLibraryForm</Edit>
-  <New>DocumentLibraryForm</New>
-</FormTemplates>
-</file>
-
-<file path=customXml/item3.xml><?xml version="1.0" encoding="utf-8"?>
 <ct:contentTypeSchema xmlns:ct="http://schemas.microsoft.com/office/2006/metadata/contentType" xmlns:ma="http://schemas.microsoft.com/office/2006/metadata/properties/metaAttributes" ct:_="" ma:_="" ma:contentTypeName="Document" ma:contentTypeID="0x010100496889825850D44592AC5D2F43187AE4" ma:contentTypeVersion="5" ma:contentTypeDescription="Create a new document." ma:contentTypeScope="" ma:versionID="2e43eb919f408cd810abfc945a86e7c8">
   <xsd:schema xmlns:xsd="http://www.w3.org/2001/XMLSchema" xmlns:xs="http://www.w3.org/2001/XMLSchema" xmlns:p="http://schemas.microsoft.com/office/2006/metadata/properties" xmlns:ns1="http://schemas.microsoft.com/sharepoint/v3" xmlns:ns2="230e9df3-be65-4c73-a93b-d1236ebd677e" xmlns:ns3="27aa9422-7f1f-4c84-9cdf-302b1a67e513" targetNamespace="http://schemas.microsoft.com/office/2006/metadata/properties" ma:root="true" ma:fieldsID="3b003b013a7c5b8f8e3d494956829bef" ns1:_="" ns2:_="" ns3:_="">
     <xsd:import namespace="http://schemas.microsoft.com/sharepoint/v3"/>
@@ -12348,33 +14724,34 @@
 </ct:contentTypeSchema>
 </file>
 
-<file path=customXml/itemProps1.xml><?xml version="1.0" encoding="utf-8"?>
-<ds:datastoreItem xmlns:ds="http://schemas.openxmlformats.org/officeDocument/2006/customXml" ds:itemID="{F990F116-B58F-4255-B05B-DA3808E0E5C6}">
-  <ds:schemaRefs>
-    <ds:schemaRef ds:uri="http://purl.org/dc/elements/1.1/"/>
-    <ds:schemaRef ds:uri="http://schemas.microsoft.com/office/2006/metadata/properties"/>
-    <ds:schemaRef ds:uri="http://schemas.microsoft.com/sharepoint/v3"/>
-    <ds:schemaRef ds:uri="230e9df3-be65-4c73-a93b-d1236ebd677e"/>
-    <ds:schemaRef ds:uri="http://purl.org/dc/terms/"/>
-    <ds:schemaRef ds:uri="http://schemas.openxmlformats.org/package/2006/metadata/core-properties"/>
-    <ds:schemaRef ds:uri="http://schemas.microsoft.com/office/2006/documentManagement/types"/>
-    <ds:schemaRef ds:uri="http://schemas.microsoft.com/office/infopath/2007/PartnerControls"/>
-    <ds:schemaRef ds:uri="27aa9422-7f1f-4c84-9cdf-302b1a67e513"/>
-    <ds:schemaRef ds:uri="http://www.w3.org/XML/1998/namespace"/>
-    <ds:schemaRef ds:uri="http://purl.org/dc/dcmitype/"/>
-  </ds:schemaRefs>
-</ds:datastoreItem>
+<file path=customXml/item2.xml><?xml version="1.0" encoding="utf-8"?>
+<?mso-contentType ?>
+<FormTemplates xmlns="http://schemas.microsoft.com/sharepoint/v3/contenttype/forms">
+  <Display>DocumentLibraryForm</Display>
+  <Edit>DocumentLibraryForm</Edit>
+  <New>DocumentLibraryForm</New>
+</FormTemplates>
 </file>
 
-<file path=customXml/itemProps2.xml><?xml version="1.0" encoding="utf-8"?>
-<ds:datastoreItem xmlns:ds="http://schemas.openxmlformats.org/officeDocument/2006/customXml" ds:itemID="{758FDAC0-319D-4A54-8D8E-1D42CB1F8004}">
-  <ds:schemaRefs>
-    <ds:schemaRef ds:uri="http://schemas.microsoft.com/sharepoint/v3/contenttype/forms"/>
-  </ds:schemaRefs>
-</ds:datastoreItem>
+<file path=customXml/item3.xml><?xml version="1.0" encoding="utf-8"?>
+<p:properties xmlns:p="http://schemas.microsoft.com/office/2006/metadata/properties" xmlns:xsi="http://www.w3.org/2001/XMLSchema-instance" xmlns:pc="http://schemas.microsoft.com/office/infopath/2007/PartnerControls">
+  <documentManagement>
+    <TaxCatchAll xmlns="230e9df3-be65-4c73-a93b-d1236ebd677e"/>
+    <PublishingExpirationDate xmlns="http://schemas.microsoft.com/sharepoint/v3" xsi:nil="true"/>
+    <PublishingStartDate xmlns="http://schemas.microsoft.com/sharepoint/v3" xsi:nil="true"/>
+    <TaxKeywordTaxHTField xmlns="230e9df3-be65-4c73-a93b-d1236ebd677e">
+      <Terms xmlns="http://schemas.microsoft.com/office/infopath/2007/PartnerControls">
+        <TermInfo xmlns="http://schemas.microsoft.com/office/infopath/2007/PartnerControls">
+          <TermName xmlns="http://schemas.microsoft.com/office/infopath/2007/PartnerControls">&lt;Any Related Keywords&gt;</TermName>
+          <TermId xmlns="http://schemas.microsoft.com/office/infopath/2007/PartnerControls">11111111-1111-1111-1111-111111111111</TermId>
+        </TermInfo>
+      </Terms>
+    </TaxKeywordTaxHTField>
+  </documentManagement>
+</p:properties>
 </file>
 
-<file path=customXml/itemProps3.xml><?xml version="1.0" encoding="utf-8"?>
+<file path=customXml/itemProps1.xml><?xml version="1.0" encoding="utf-8"?>
 <ds:datastoreItem xmlns:ds="http://schemas.openxmlformats.org/officeDocument/2006/customXml" ds:itemID="{8279456A-742D-4736-95C0-19A1E0B853B2}">
   <ds:schemaRefs>
     <ds:schemaRef ds:uri="http://schemas.microsoft.com/office/2006/metadata/contentType"/>
@@ -12392,4 +14769,30 @@
     <ds:schemaRef ds:uri="http://schemas.microsoft.com/internal/obd"/>
   </ds:schemaRefs>
 </ds:datastoreItem>
+</file>
+
+<file path=customXml/itemProps2.xml><?xml version="1.0" encoding="utf-8"?>
+<ds:datastoreItem xmlns:ds="http://schemas.openxmlformats.org/officeDocument/2006/customXml" ds:itemID="{758FDAC0-319D-4A54-8D8E-1D42CB1F8004}">
+  <ds:schemaRefs>
+    <ds:schemaRef ds:uri="http://schemas.microsoft.com/sharepoint/v3/contenttype/forms"/>
+  </ds:schemaRefs>
+</ds:datastoreItem>
+</file>
+
+<file path=customXml/itemProps3.xml><?xml version="1.0" encoding="utf-8"?>
+<ds:datastoreItem xmlns:ds="http://schemas.openxmlformats.org/officeDocument/2006/customXml" ds:itemID="{F990F116-B58F-4255-B05B-DA3808E0E5C6}">
+  <ds:schemaRefs>
+    <ds:schemaRef ds:uri="http://purl.org/dc/elements/1.1/"/>
+    <ds:schemaRef ds:uri="http://schemas.microsoft.com/office/2006/metadata/properties"/>
+    <ds:schemaRef ds:uri="http://schemas.microsoft.com/sharepoint/v3"/>
+    <ds:schemaRef ds:uri="230e9df3-be65-4c73-a93b-d1236ebd677e"/>
+    <ds:schemaRef ds:uri="http://purl.org/dc/terms/"/>
+    <ds:schemaRef ds:uri="http://schemas.openxmlformats.org/package/2006/metadata/core-properties"/>
+    <ds:schemaRef ds:uri="http://schemas.microsoft.com/office/2006/documentManagement/types"/>
+    <ds:schemaRef ds:uri="http://schemas.microsoft.com/office/infopath/2007/PartnerControls"/>
+    <ds:schemaRef ds:uri="27aa9422-7f1f-4c84-9cdf-302b1a67e513"/>
+    <ds:schemaRef ds:uri="http://www.w3.org/XML/1998/namespace"/>
+    <ds:schemaRef ds:uri="http://purl.org/dc/dcmitype/"/>
+  </ds:schemaRefs>
+</ds:datastoreItem>
 </file>
</xml_diff>